<commit_message>
Add ConsolePluginTester project and UI enhancements
- Introduced a new project "ConsolePluginTester" in the solution.
- Updated `AIKernelClient.csproj` to target `net9.0` and changed default language to `en-us`.
- Enhanced `MainPage.xaml` with new UI elements for better user experience.
- Modified event handler signatures in `MainPage.xaml.cs` to remove nullable types.
- Updated `Styles.xaml` to change `Border` properties.
- Refactored `House` class initialization for `Lights` with improved clarity.
- Revised property descriptions in `Light` and `Room` classes.
- Added new API endpoints in `LightsControllerAPI.http` for light control.
- Enhanced `Program.cs` for Semantic Kernel integration and OpenAI setup.
- Updated `MainWindowViewModel.cs` to align with new light and room mappings.
- Improved `KitchenView.xaml` with additional visual elements for lights.
- Created `ConsolePluginTester.csproj` with necessary package references.
</commit_message>
<xml_diff>
--- a/AI Friendly APIs.pptx
+++ b/AI Friendly APIs.pptx
@@ -6,6 +6,7 @@
   </p:sldMasterIdLst>
   <p:sldIdLst>
     <p:sldId id="256" r:id="rId2"/>
+    <p:sldId id="257" r:id="rId3"/>
   </p:sldIdLst>
   <p:sldSz cx="12192000" cy="6858000"/>
   <p:notesSz cx="6858000" cy="9144000"/>
@@ -104,6 +105,11 @@
       </a:defRPr>
     </a:lvl9pPr>
   </p:defaultTextStyle>
+  <p:extLst>
+    <p:ext uri="{EFAFB233-063F-42B5-8137-9DF3F51BA10A}">
+      <p15:sldGuideLst xmlns:p15="http://schemas.microsoft.com/office/powerpoint/2012/main"/>
+    </p:ext>
+  </p:extLst>
 </p:presentation>
 </file>
 
@@ -254,7 +260,7 @@
           <a:p>
             <a:fld id="{9564C4B6-AF8B-47D1-A3BA-C9921D51DAF6}" type="datetimeFigureOut">
               <a:rPr lang="en-US" smtClean="0"/>
-              <a:t>1/29/2025</a:t>
+              <a:t>2/1/2025</a:t>
             </a:fld>
             <a:endParaRPr lang="en-US"/>
           </a:p>
@@ -452,7 +458,7 @@
           <a:p>
             <a:fld id="{9564C4B6-AF8B-47D1-A3BA-C9921D51DAF6}" type="datetimeFigureOut">
               <a:rPr lang="en-US" smtClean="0"/>
-              <a:t>1/29/2025</a:t>
+              <a:t>2/1/2025</a:t>
             </a:fld>
             <a:endParaRPr lang="en-US"/>
           </a:p>
@@ -660,7 +666,7 @@
           <a:p>
             <a:fld id="{9564C4B6-AF8B-47D1-A3BA-C9921D51DAF6}" type="datetimeFigureOut">
               <a:rPr lang="en-US" smtClean="0"/>
-              <a:t>1/29/2025</a:t>
+              <a:t>2/1/2025</a:t>
             </a:fld>
             <a:endParaRPr lang="en-US"/>
           </a:p>
@@ -858,7 +864,7 @@
           <a:p>
             <a:fld id="{9564C4B6-AF8B-47D1-A3BA-C9921D51DAF6}" type="datetimeFigureOut">
               <a:rPr lang="en-US" smtClean="0"/>
-              <a:t>1/29/2025</a:t>
+              <a:t>2/1/2025</a:t>
             </a:fld>
             <a:endParaRPr lang="en-US"/>
           </a:p>
@@ -1133,7 +1139,7 @@
           <a:p>
             <a:fld id="{9564C4B6-AF8B-47D1-A3BA-C9921D51DAF6}" type="datetimeFigureOut">
               <a:rPr lang="en-US" smtClean="0"/>
-              <a:t>1/29/2025</a:t>
+              <a:t>2/1/2025</a:t>
             </a:fld>
             <a:endParaRPr lang="en-US"/>
           </a:p>
@@ -1398,7 +1404,7 @@
           <a:p>
             <a:fld id="{9564C4B6-AF8B-47D1-A3BA-C9921D51DAF6}" type="datetimeFigureOut">
               <a:rPr lang="en-US" smtClean="0"/>
-              <a:t>1/29/2025</a:t>
+              <a:t>2/1/2025</a:t>
             </a:fld>
             <a:endParaRPr lang="en-US"/>
           </a:p>
@@ -1810,7 +1816,7 @@
           <a:p>
             <a:fld id="{9564C4B6-AF8B-47D1-A3BA-C9921D51DAF6}" type="datetimeFigureOut">
               <a:rPr lang="en-US" smtClean="0"/>
-              <a:t>1/29/2025</a:t>
+              <a:t>2/1/2025</a:t>
             </a:fld>
             <a:endParaRPr lang="en-US"/>
           </a:p>
@@ -1951,7 +1957,7 @@
           <a:p>
             <a:fld id="{9564C4B6-AF8B-47D1-A3BA-C9921D51DAF6}" type="datetimeFigureOut">
               <a:rPr lang="en-US" smtClean="0"/>
-              <a:t>1/29/2025</a:t>
+              <a:t>2/1/2025</a:t>
             </a:fld>
             <a:endParaRPr lang="en-US"/>
           </a:p>
@@ -2064,7 +2070,7 @@
           <a:p>
             <a:fld id="{9564C4B6-AF8B-47D1-A3BA-C9921D51DAF6}" type="datetimeFigureOut">
               <a:rPr lang="en-US" smtClean="0"/>
-              <a:t>1/29/2025</a:t>
+              <a:t>2/1/2025</a:t>
             </a:fld>
             <a:endParaRPr lang="en-US"/>
           </a:p>
@@ -2375,7 +2381,7 @@
           <a:p>
             <a:fld id="{9564C4B6-AF8B-47D1-A3BA-C9921D51DAF6}" type="datetimeFigureOut">
               <a:rPr lang="en-US" smtClean="0"/>
-              <a:t>1/29/2025</a:t>
+              <a:t>2/1/2025</a:t>
             </a:fld>
             <a:endParaRPr lang="en-US"/>
           </a:p>
@@ -2663,7 +2669,7 @@
           <a:p>
             <a:fld id="{9564C4B6-AF8B-47D1-A3BA-C9921D51DAF6}" type="datetimeFigureOut">
               <a:rPr lang="en-US" smtClean="0"/>
-              <a:t>1/29/2025</a:t>
+              <a:t>2/1/2025</a:t>
             </a:fld>
             <a:endParaRPr lang="en-US"/>
           </a:p>
@@ -2904,7 +2910,7 @@
           <a:p>
             <a:fld id="{9564C4B6-AF8B-47D1-A3BA-C9921D51DAF6}" type="datetimeFigureOut">
               <a:rPr lang="en-US" smtClean="0"/>
-              <a:t>1/29/2025</a:t>
+              <a:t>2/1/2025</a:t>
             </a:fld>
             <a:endParaRPr lang="en-US"/>
           </a:p>
@@ -3335,7 +3341,7 @@
         </p:nvSpPr>
         <p:spPr>
           <a:xfrm>
-            <a:off x="2011146" y="1219735"/>
+            <a:off x="2280386" y="2123975"/>
             <a:ext cx="1196282" cy="1134406"/>
           </a:xfrm>
           <a:prstGeom prst="flowChartConnector">
@@ -3384,7 +3390,7 @@
         </p:nvSpPr>
         <p:spPr>
           <a:xfrm>
-            <a:off x="2011146" y="3052392"/>
+            <a:off x="2280386" y="3956632"/>
             <a:ext cx="1223784" cy="1134406"/>
           </a:xfrm>
           <a:prstGeom prst="ellipse">
@@ -3438,7 +3444,7 @@
         </p:nvSpPr>
         <p:spPr>
           <a:xfrm>
-            <a:off x="2986849" y="1374426"/>
+            <a:off x="3256089" y="2278666"/>
             <a:ext cx="773459" cy="825023"/>
           </a:xfrm>
           <a:prstGeom prst="flowChartConnector">
@@ -3487,7 +3493,7 @@
         </p:nvSpPr>
         <p:spPr>
           <a:xfrm>
-            <a:off x="5564472" y="1219735"/>
+            <a:off x="5833712" y="2123975"/>
             <a:ext cx="1196282" cy="1134406"/>
           </a:xfrm>
           <a:prstGeom prst="flowChartConnector">
@@ -3536,12 +3542,18 @@
         </p:nvSpPr>
         <p:spPr>
           <a:xfrm>
-            <a:off x="5564472" y="2485189"/>
+            <a:off x="5833712" y="3389429"/>
             <a:ext cx="1196282" cy="1134406"/>
           </a:xfrm>
           <a:prstGeom prst="flowChartConnector">
             <a:avLst/>
           </a:prstGeom>
+          <a:solidFill>
+            <a:schemeClr val="accent6">
+              <a:lumMod val="60000"/>
+              <a:lumOff val="40000"/>
+            </a:schemeClr>
+          </a:solidFill>
         </p:spPr>
         <p:style>
           <a:lnRef idx="2">
@@ -3571,12 +3583,896 @@
           </a:p>
         </p:txBody>
       </p:sp>
+      <p:sp>
+        <p:nvSpPr>
+          <p:cNvPr id="4" name="Flowchart: Connector 3">
+            <a:extLst>
+              <a:ext uri="{FF2B5EF4-FFF2-40B4-BE49-F238E27FC236}">
+                <a16:creationId xmlns:a16="http://schemas.microsoft.com/office/drawing/2014/main" id="{65740EC3-4A52-287D-E0CF-EDF61766324C}"/>
+              </a:ext>
+            </a:extLst>
+          </p:cNvPr>
+          <p:cNvSpPr/>
+          <p:nvPr/>
+        </p:nvSpPr>
+        <p:spPr>
+          <a:xfrm>
+            <a:off x="4029548" y="4807056"/>
+            <a:ext cx="1196282" cy="1134406"/>
+          </a:xfrm>
+          <a:prstGeom prst="flowChartConnector">
+            <a:avLst/>
+          </a:prstGeom>
+        </p:spPr>
+        <p:style>
+          <a:lnRef idx="2">
+            <a:schemeClr val="accent2">
+              <a:shade val="15000"/>
+            </a:schemeClr>
+          </a:lnRef>
+          <a:fillRef idx="1">
+            <a:schemeClr val="accent2"/>
+          </a:fillRef>
+          <a:effectRef idx="0">
+            <a:schemeClr val="accent2"/>
+          </a:effectRef>
+          <a:fontRef idx="minor">
+            <a:schemeClr val="lt1"/>
+          </a:fontRef>
+        </p:style>
+        <p:txBody>
+          <a:bodyPr rtlCol="0" anchor="ctr"/>
+          <a:lstStyle/>
+          <a:p>
+            <a:pPr algn="ctr"/>
+            <a:r>
+              <a:rPr lang="en-US" sz="1600" dirty="0"/>
+              <a:t>Service </a:t>
+            </a:r>
+          </a:p>
+        </p:txBody>
+      </p:sp>
+      <p:sp>
+        <p:nvSpPr>
+          <p:cNvPr id="10" name="Flowchart: Connector 9">
+            <a:extLst>
+              <a:ext uri="{FF2B5EF4-FFF2-40B4-BE49-F238E27FC236}">
+                <a16:creationId xmlns:a16="http://schemas.microsoft.com/office/drawing/2014/main" id="{608CE41C-2FB8-21CA-2264-711C3EF43E77}"/>
+              </a:ext>
+            </a:extLst>
+          </p:cNvPr>
+          <p:cNvSpPr/>
+          <p:nvPr/>
+        </p:nvSpPr>
+        <p:spPr>
+          <a:xfrm>
+            <a:off x="4493622" y="4342982"/>
+            <a:ext cx="268133" cy="288757"/>
+          </a:xfrm>
+          <a:prstGeom prst="flowChartConnector">
+            <a:avLst/>
+          </a:prstGeom>
+          <a:solidFill>
+            <a:schemeClr val="accent2"/>
+          </a:solidFill>
+        </p:spPr>
+        <p:style>
+          <a:lnRef idx="2">
+            <a:schemeClr val="accent1">
+              <a:shade val="15000"/>
+            </a:schemeClr>
+          </a:lnRef>
+          <a:fillRef idx="1">
+            <a:schemeClr val="accent1"/>
+          </a:fillRef>
+          <a:effectRef idx="0">
+            <a:schemeClr val="accent1"/>
+          </a:effectRef>
+          <a:fontRef idx="minor">
+            <a:schemeClr val="lt1"/>
+          </a:fontRef>
+        </p:style>
+        <p:txBody>
+          <a:bodyPr rtlCol="0" anchor="ctr"/>
+          <a:lstStyle/>
+          <a:p>
+            <a:pPr algn="ctr"/>
+            <a:endParaRPr lang="en-US"/>
+          </a:p>
+        </p:txBody>
+      </p:sp>
+      <p:cxnSp>
+        <p:nvCxnSpPr>
+          <p:cNvPr id="12" name="Straight Connector 11">
+            <a:extLst>
+              <a:ext uri="{FF2B5EF4-FFF2-40B4-BE49-F238E27FC236}">
+                <a16:creationId xmlns:a16="http://schemas.microsoft.com/office/drawing/2014/main" id="{9128A815-CD7C-4342-D0F5-602A25BA6EA0}"/>
+              </a:ext>
+            </a:extLst>
+          </p:cNvPr>
+          <p:cNvCxnSpPr>
+            <a:cxnSpLocks/>
+            <a:endCxn id="4" idx="0"/>
+          </p:cNvCxnSpPr>
+          <p:nvPr/>
+        </p:nvCxnSpPr>
+        <p:spPr>
+          <a:xfrm>
+            <a:off x="4627688" y="4631739"/>
+            <a:ext cx="1" cy="175317"/>
+          </a:xfrm>
+          <a:prstGeom prst="line">
+            <a:avLst/>
+          </a:prstGeom>
+        </p:spPr>
+        <p:style>
+          <a:lnRef idx="2">
+            <a:schemeClr val="accent1"/>
+          </a:lnRef>
+          <a:fillRef idx="0">
+            <a:schemeClr val="accent1"/>
+          </a:fillRef>
+          <a:effectRef idx="1">
+            <a:schemeClr val="accent1"/>
+          </a:effectRef>
+          <a:fontRef idx="minor">
+            <a:schemeClr val="tx1"/>
+          </a:fontRef>
+        </p:style>
+      </p:cxnSp>
+      <p:cxnSp>
+        <p:nvCxnSpPr>
+          <p:cNvPr id="16" name="Straight Arrow Connector 15">
+            <a:extLst>
+              <a:ext uri="{FF2B5EF4-FFF2-40B4-BE49-F238E27FC236}">
+                <a16:creationId xmlns:a16="http://schemas.microsoft.com/office/drawing/2014/main" id="{AC6ECD2E-5205-21AF-3DCA-9E60A6F3C52D}"/>
+              </a:ext>
+            </a:extLst>
+          </p:cNvPr>
+          <p:cNvCxnSpPr>
+            <a:cxnSpLocks/>
+            <a:stCxn id="10" idx="2"/>
+            <a:endCxn id="5" idx="6"/>
+          </p:cNvCxnSpPr>
+          <p:nvPr/>
+        </p:nvCxnSpPr>
+        <p:spPr>
+          <a:xfrm flipH="1">
+            <a:off x="3504170" y="4487361"/>
+            <a:ext cx="989452" cy="36474"/>
+          </a:xfrm>
+          <a:prstGeom prst="straightConnector1">
+            <a:avLst/>
+          </a:prstGeom>
+          <a:ln>
+            <a:tailEnd type="triangle"/>
+          </a:ln>
+        </p:spPr>
+        <p:style>
+          <a:lnRef idx="2">
+            <a:schemeClr val="accent1"/>
+          </a:lnRef>
+          <a:fillRef idx="0">
+            <a:schemeClr val="accent1"/>
+          </a:fillRef>
+          <a:effectRef idx="1">
+            <a:schemeClr val="accent1"/>
+          </a:effectRef>
+          <a:fontRef idx="minor">
+            <a:schemeClr val="tx1"/>
+          </a:fontRef>
+        </p:style>
+      </p:cxnSp>
+      <p:cxnSp>
+        <p:nvCxnSpPr>
+          <p:cNvPr id="18" name="Straight Arrow Connector 17">
+            <a:extLst>
+              <a:ext uri="{FF2B5EF4-FFF2-40B4-BE49-F238E27FC236}">
+                <a16:creationId xmlns:a16="http://schemas.microsoft.com/office/drawing/2014/main" id="{F339B734-0745-C2D0-01E9-4C9161B30F1F}"/>
+              </a:ext>
+            </a:extLst>
+          </p:cNvPr>
+          <p:cNvCxnSpPr>
+            <a:stCxn id="6" idx="6"/>
+            <a:endCxn id="7" idx="2"/>
+          </p:cNvCxnSpPr>
+          <p:nvPr/>
+        </p:nvCxnSpPr>
+        <p:spPr>
+          <a:xfrm>
+            <a:off x="4029548" y="2691178"/>
+            <a:ext cx="1804164" cy="0"/>
+          </a:xfrm>
+          <a:prstGeom prst="straightConnector1">
+            <a:avLst/>
+          </a:prstGeom>
+          <a:ln>
+            <a:headEnd type="triangle"/>
+            <a:tailEnd type="triangle"/>
+          </a:ln>
+        </p:spPr>
+        <p:style>
+          <a:lnRef idx="2">
+            <a:schemeClr val="accent1"/>
+          </a:lnRef>
+          <a:fillRef idx="0">
+            <a:schemeClr val="accent1"/>
+          </a:fillRef>
+          <a:effectRef idx="1">
+            <a:schemeClr val="accent1"/>
+          </a:effectRef>
+          <a:fontRef idx="minor">
+            <a:schemeClr val="tx1"/>
+          </a:fontRef>
+        </p:style>
+      </p:cxnSp>
+      <p:cxnSp>
+        <p:nvCxnSpPr>
+          <p:cNvPr id="20" name="Straight Arrow Connector 19">
+            <a:extLst>
+              <a:ext uri="{FF2B5EF4-FFF2-40B4-BE49-F238E27FC236}">
+                <a16:creationId xmlns:a16="http://schemas.microsoft.com/office/drawing/2014/main" id="{802C092D-AEDB-A5FC-8F11-A463874C936A}"/>
+              </a:ext>
+            </a:extLst>
+          </p:cNvPr>
+          <p:cNvCxnSpPr>
+            <a:cxnSpLocks/>
+            <a:stCxn id="6" idx="5"/>
+            <a:endCxn id="10" idx="1"/>
+          </p:cNvCxnSpPr>
+          <p:nvPr/>
+        </p:nvCxnSpPr>
+        <p:spPr>
+          <a:xfrm>
+            <a:off x="3916278" y="2982867"/>
+            <a:ext cx="616611" cy="1402402"/>
+          </a:xfrm>
+          <a:prstGeom prst="straightConnector1">
+            <a:avLst/>
+          </a:prstGeom>
+          <a:ln>
+            <a:headEnd type="triangle"/>
+            <a:tailEnd type="triangle"/>
+          </a:ln>
+        </p:spPr>
+        <p:style>
+          <a:lnRef idx="2">
+            <a:schemeClr val="accent1"/>
+          </a:lnRef>
+          <a:fillRef idx="0">
+            <a:schemeClr val="accent1"/>
+          </a:fillRef>
+          <a:effectRef idx="1">
+            <a:schemeClr val="accent1"/>
+          </a:effectRef>
+          <a:fontRef idx="minor">
+            <a:schemeClr val="tx1"/>
+          </a:fontRef>
+        </p:style>
+      </p:cxnSp>
+      <p:sp>
+        <p:nvSpPr>
+          <p:cNvPr id="24" name="Flowchart: Connector 23">
+            <a:extLst>
+              <a:ext uri="{FF2B5EF4-FFF2-40B4-BE49-F238E27FC236}">
+                <a16:creationId xmlns:a16="http://schemas.microsoft.com/office/drawing/2014/main" id="{7C2147B3-E070-B0E7-0702-6F1507F0D7EC}"/>
+              </a:ext>
+            </a:extLst>
+          </p:cNvPr>
+          <p:cNvSpPr/>
+          <p:nvPr/>
+        </p:nvSpPr>
+        <p:spPr>
+          <a:xfrm>
+            <a:off x="5986112" y="3541829"/>
+            <a:ext cx="1196282" cy="1134406"/>
+          </a:xfrm>
+          <a:prstGeom prst="flowChartConnector">
+            <a:avLst/>
+          </a:prstGeom>
+          <a:solidFill>
+            <a:schemeClr val="accent6">
+              <a:lumMod val="60000"/>
+              <a:lumOff val="40000"/>
+            </a:schemeClr>
+          </a:solidFill>
+        </p:spPr>
+        <p:style>
+          <a:lnRef idx="2">
+            <a:schemeClr val="accent2">
+              <a:shade val="15000"/>
+            </a:schemeClr>
+          </a:lnRef>
+          <a:fillRef idx="1">
+            <a:schemeClr val="accent2"/>
+          </a:fillRef>
+          <a:effectRef idx="0">
+            <a:schemeClr val="accent2"/>
+          </a:effectRef>
+          <a:fontRef idx="minor">
+            <a:schemeClr val="lt1"/>
+          </a:fontRef>
+        </p:style>
+        <p:txBody>
+          <a:bodyPr rtlCol="0" anchor="ctr"/>
+          <a:lstStyle/>
+          <a:p>
+            <a:pPr algn="ctr"/>
+            <a:r>
+              <a:rPr lang="en-US" sz="1600" dirty="0"/>
+              <a:t>LLM </a:t>
+            </a:r>
+          </a:p>
+        </p:txBody>
+      </p:sp>
+      <p:sp>
+        <p:nvSpPr>
+          <p:cNvPr id="25" name="Flowchart: Connector 24">
+            <a:extLst>
+              <a:ext uri="{FF2B5EF4-FFF2-40B4-BE49-F238E27FC236}">
+                <a16:creationId xmlns:a16="http://schemas.microsoft.com/office/drawing/2014/main" id="{561D299E-4498-D11F-FCE8-2181549A5D4A}"/>
+              </a:ext>
+            </a:extLst>
+          </p:cNvPr>
+          <p:cNvSpPr/>
+          <p:nvPr/>
+        </p:nvSpPr>
+        <p:spPr>
+          <a:xfrm>
+            <a:off x="6138512" y="3694229"/>
+            <a:ext cx="1196282" cy="1134406"/>
+          </a:xfrm>
+          <a:prstGeom prst="flowChartConnector">
+            <a:avLst/>
+          </a:prstGeom>
+          <a:solidFill>
+            <a:schemeClr val="accent6">
+              <a:lumMod val="60000"/>
+              <a:lumOff val="40000"/>
+            </a:schemeClr>
+          </a:solidFill>
+        </p:spPr>
+        <p:style>
+          <a:lnRef idx="2">
+            <a:schemeClr val="accent2">
+              <a:shade val="15000"/>
+            </a:schemeClr>
+          </a:lnRef>
+          <a:fillRef idx="1">
+            <a:schemeClr val="accent2"/>
+          </a:fillRef>
+          <a:effectRef idx="0">
+            <a:schemeClr val="accent2"/>
+          </a:effectRef>
+          <a:fontRef idx="minor">
+            <a:schemeClr val="lt1"/>
+          </a:fontRef>
+        </p:style>
+        <p:txBody>
+          <a:bodyPr rtlCol="0" anchor="ctr"/>
+          <a:lstStyle/>
+          <a:p>
+            <a:pPr algn="ctr"/>
+            <a:r>
+              <a:rPr lang="en-US" sz="1600" dirty="0"/>
+              <a:t>LLM </a:t>
+            </a:r>
+          </a:p>
+        </p:txBody>
+      </p:sp>
+      <p:sp>
+        <p:nvSpPr>
+          <p:cNvPr id="26" name="Title 25">
+            <a:extLst>
+              <a:ext uri="{FF2B5EF4-FFF2-40B4-BE49-F238E27FC236}">
+                <a16:creationId xmlns:a16="http://schemas.microsoft.com/office/drawing/2014/main" id="{37B2E8B5-2048-C69A-7E08-BABE8BCC8F84}"/>
+              </a:ext>
+            </a:extLst>
+          </p:cNvPr>
+          <p:cNvSpPr>
+            <a:spLocks noGrp="1"/>
+          </p:cNvSpPr>
+          <p:nvPr>
+            <p:ph type="title"/>
+          </p:nvPr>
+        </p:nvSpPr>
+        <p:spPr/>
+        <p:txBody>
+          <a:bodyPr/>
+          <a:lstStyle/>
+          <a:p>
+            <a:r>
+              <a:rPr lang="en-US" dirty="0"/>
+              <a:t>Demo Architecture</a:t>
+            </a:r>
+          </a:p>
+        </p:txBody>
+      </p:sp>
+      <p:cxnSp>
+        <p:nvCxnSpPr>
+          <p:cNvPr id="27" name="Straight Arrow Connector 26">
+            <a:extLst>
+              <a:ext uri="{FF2B5EF4-FFF2-40B4-BE49-F238E27FC236}">
+                <a16:creationId xmlns:a16="http://schemas.microsoft.com/office/drawing/2014/main" id="{BD1BA78F-8189-91BF-EC65-61D762BAD9A1}"/>
+              </a:ext>
+            </a:extLst>
+          </p:cNvPr>
+          <p:cNvCxnSpPr>
+            <a:cxnSpLocks/>
+            <a:stCxn id="6" idx="6"/>
+            <a:endCxn id="9" idx="1"/>
+          </p:cNvCxnSpPr>
+          <p:nvPr/>
+        </p:nvCxnSpPr>
+        <p:spPr>
+          <a:xfrm>
+            <a:off x="4029548" y="2691178"/>
+            <a:ext cx="1979355" cy="864381"/>
+          </a:xfrm>
+          <a:prstGeom prst="straightConnector1">
+            <a:avLst/>
+          </a:prstGeom>
+          <a:ln>
+            <a:headEnd type="triangle"/>
+            <a:tailEnd type="triangle"/>
+          </a:ln>
+        </p:spPr>
+        <p:style>
+          <a:lnRef idx="2">
+            <a:schemeClr val="accent1"/>
+          </a:lnRef>
+          <a:fillRef idx="0">
+            <a:schemeClr val="accent1"/>
+          </a:fillRef>
+          <a:effectRef idx="1">
+            <a:schemeClr val="accent1"/>
+          </a:effectRef>
+          <a:fontRef idx="minor">
+            <a:schemeClr val="tx1"/>
+          </a:fontRef>
+        </p:style>
+      </p:cxnSp>
+      <p:sp>
+        <p:nvSpPr>
+          <p:cNvPr id="30" name="TextBox 29">
+            <a:extLst>
+              <a:ext uri="{FF2B5EF4-FFF2-40B4-BE49-F238E27FC236}">
+                <a16:creationId xmlns:a16="http://schemas.microsoft.com/office/drawing/2014/main" id="{D7280BAD-DE7F-9C53-0345-4B409203D7BD}"/>
+              </a:ext>
+            </a:extLst>
+          </p:cNvPr>
+          <p:cNvSpPr txBox="1"/>
+          <p:nvPr/>
+        </p:nvSpPr>
+        <p:spPr>
+          <a:xfrm>
+            <a:off x="8366760" y="492760"/>
+            <a:ext cx="3426650" cy="1200329"/>
+          </a:xfrm>
+          <a:prstGeom prst="rect">
+            <a:avLst/>
+          </a:prstGeom>
+          <a:noFill/>
+        </p:spPr>
+        <p:txBody>
+          <a:bodyPr wrap="square" rtlCol="0">
+            <a:spAutoFit/>
+          </a:bodyPr>
+          <a:lstStyle/>
+          <a:p>
+            <a:r>
+              <a:rPr lang="en-US" dirty="0" err="1"/>
+              <a:t>OpenAPI</a:t>
+            </a:r>
+            <a:endParaRPr lang="en-US" dirty="0"/>
+          </a:p>
+          <a:p>
+            <a:r>
+              <a:rPr lang="en-US" dirty="0"/>
+              <a:t>Semantic Kernel</a:t>
+            </a:r>
+          </a:p>
+          <a:p>
+            <a:r>
+              <a:rPr lang="en-US" dirty="0"/>
+              <a:t>Chat GPT</a:t>
+            </a:r>
+          </a:p>
+          <a:p>
+            <a:r>
+              <a:rPr lang="en-US" dirty="0"/>
+              <a:t>Copilot GPT</a:t>
+            </a:r>
+          </a:p>
+        </p:txBody>
+      </p:sp>
+      <p:sp>
+        <p:nvSpPr>
+          <p:cNvPr id="31" name="Flowchart: Connector 30">
+            <a:extLst>
+              <a:ext uri="{FF2B5EF4-FFF2-40B4-BE49-F238E27FC236}">
+                <a16:creationId xmlns:a16="http://schemas.microsoft.com/office/drawing/2014/main" id="{F01D0EA4-0051-399D-7E42-B7B4CD9CF432}"/>
+              </a:ext>
+            </a:extLst>
+          </p:cNvPr>
+          <p:cNvSpPr/>
+          <p:nvPr/>
+        </p:nvSpPr>
+        <p:spPr>
+          <a:xfrm>
+            <a:off x="4781101" y="4351003"/>
+            <a:ext cx="268133" cy="288757"/>
+          </a:xfrm>
+          <a:prstGeom prst="flowChartConnector">
+            <a:avLst/>
+          </a:prstGeom>
+          <a:solidFill>
+            <a:schemeClr val="accent2">
+              <a:lumMod val="60000"/>
+              <a:lumOff val="40000"/>
+            </a:schemeClr>
+          </a:solidFill>
+        </p:spPr>
+        <p:style>
+          <a:lnRef idx="2">
+            <a:schemeClr val="accent1">
+              <a:shade val="15000"/>
+            </a:schemeClr>
+          </a:lnRef>
+          <a:fillRef idx="1">
+            <a:schemeClr val="accent1"/>
+          </a:fillRef>
+          <a:effectRef idx="0">
+            <a:schemeClr val="accent1"/>
+          </a:effectRef>
+          <a:fontRef idx="minor">
+            <a:schemeClr val="lt1"/>
+          </a:fontRef>
+        </p:style>
+        <p:txBody>
+          <a:bodyPr rtlCol="0" anchor="ctr"/>
+          <a:lstStyle/>
+          <a:p>
+            <a:pPr algn="ctr"/>
+            <a:endParaRPr lang="en-US"/>
+          </a:p>
+        </p:txBody>
+      </p:sp>
+      <p:cxnSp>
+        <p:nvCxnSpPr>
+          <p:cNvPr id="32" name="Straight Arrow Connector 31">
+            <a:extLst>
+              <a:ext uri="{FF2B5EF4-FFF2-40B4-BE49-F238E27FC236}">
+                <a16:creationId xmlns:a16="http://schemas.microsoft.com/office/drawing/2014/main" id="{AE0D0D00-42C9-4955-16C2-F0FD724DE75B}"/>
+              </a:ext>
+            </a:extLst>
+          </p:cNvPr>
+          <p:cNvCxnSpPr>
+            <a:cxnSpLocks/>
+            <a:stCxn id="6" idx="5"/>
+            <a:endCxn id="31" idx="0"/>
+          </p:cNvCxnSpPr>
+          <p:nvPr/>
+        </p:nvCxnSpPr>
+        <p:spPr>
+          <a:xfrm>
+            <a:off x="3916278" y="2982867"/>
+            <a:ext cx="998890" cy="1368136"/>
+          </a:xfrm>
+          <a:prstGeom prst="straightConnector1">
+            <a:avLst/>
+          </a:prstGeom>
+          <a:ln>
+            <a:headEnd type="triangle"/>
+            <a:tailEnd type="triangle"/>
+          </a:ln>
+        </p:spPr>
+        <p:style>
+          <a:lnRef idx="2">
+            <a:schemeClr val="accent1"/>
+          </a:lnRef>
+          <a:fillRef idx="0">
+            <a:schemeClr val="accent1"/>
+          </a:fillRef>
+          <a:effectRef idx="1">
+            <a:schemeClr val="accent1"/>
+          </a:effectRef>
+          <a:fontRef idx="minor">
+            <a:schemeClr val="tx1"/>
+          </a:fontRef>
+        </p:style>
+      </p:cxnSp>
+      <p:sp>
+        <p:nvSpPr>
+          <p:cNvPr id="36" name="TextBox 35">
+            <a:extLst>
+              <a:ext uri="{FF2B5EF4-FFF2-40B4-BE49-F238E27FC236}">
+                <a16:creationId xmlns:a16="http://schemas.microsoft.com/office/drawing/2014/main" id="{B0F7B519-F416-399B-D122-16B1BBB59AE9}"/>
+              </a:ext>
+            </a:extLst>
+          </p:cNvPr>
+          <p:cNvSpPr txBox="1"/>
+          <p:nvPr/>
+        </p:nvSpPr>
+        <p:spPr>
+          <a:xfrm>
+            <a:off x="5000734" y="4249948"/>
+            <a:ext cx="859531" cy="415498"/>
+          </a:xfrm>
+          <a:prstGeom prst="rect">
+            <a:avLst/>
+          </a:prstGeom>
+          <a:noFill/>
+        </p:spPr>
+        <p:txBody>
+          <a:bodyPr wrap="none" rtlCol="0">
+            <a:spAutoFit/>
+          </a:bodyPr>
+          <a:lstStyle/>
+          <a:p>
+            <a:r>
+              <a:rPr lang="en-US" sz="1050" dirty="0" err="1"/>
+              <a:t>OpenAPI</a:t>
+            </a:r>
+            <a:endParaRPr lang="en-US" sz="1050" dirty="0"/>
+          </a:p>
+          <a:p>
+            <a:r>
+              <a:rPr lang="en-US" sz="1050" dirty="0"/>
+              <a:t>Description</a:t>
+            </a:r>
+          </a:p>
+        </p:txBody>
+      </p:sp>
+    </p:spTree>
+    <p:extLst>
+      <p:ext uri="{BB962C8B-B14F-4D97-AF65-F5344CB8AC3E}">
+        <p14:creationId xmlns:p14="http://schemas.microsoft.com/office/powerpoint/2010/main" val="2821312262"/>
+      </p:ext>
+    </p:extLst>
+  </p:cSld>
+  <p:clrMapOvr>
+    <a:masterClrMapping/>
+  </p:clrMapOvr>
+</p:sld>
+</file>
+
+<file path=ppt/slides/slide2.xml><?xml version="1.0" encoding="utf-8"?>
+<p:sld xmlns:a="http://schemas.openxmlformats.org/drawingml/2006/main" xmlns:r="http://schemas.openxmlformats.org/officeDocument/2006/relationships" xmlns:p="http://schemas.openxmlformats.org/presentationml/2006/main">
+  <p:cSld>
+    <p:spTree>
+      <p:nvGrpSpPr>
+        <p:cNvPr id="1" name="">
+          <a:extLst>
+            <a:ext uri="{FF2B5EF4-FFF2-40B4-BE49-F238E27FC236}">
+              <a16:creationId xmlns:a16="http://schemas.microsoft.com/office/drawing/2014/main" id="{8FCAAE7E-4F3A-3A2C-F751-1811D44F5FD3}"/>
+            </a:ext>
+          </a:extLst>
+        </p:cNvPr>
+        <p:cNvGrpSpPr/>
+        <p:nvPr/>
+      </p:nvGrpSpPr>
+      <p:grpSpPr>
+        <a:xfrm>
+          <a:off x="0" y="0"/>
+          <a:ext cx="0" cy="0"/>
+          <a:chOff x="0" y="0"/>
+          <a:chExt cx="0" cy="0"/>
+        </a:xfrm>
+      </p:grpSpPr>
+      <p:sp>
+        <p:nvSpPr>
+          <p:cNvPr id="8" name="Flowchart: Connector 7">
+            <a:extLst>
+              <a:ext uri="{FF2B5EF4-FFF2-40B4-BE49-F238E27FC236}">
+                <a16:creationId xmlns:a16="http://schemas.microsoft.com/office/drawing/2014/main" id="{279E0C81-6286-82C7-48A1-AA555C76711D}"/>
+              </a:ext>
+            </a:extLst>
+          </p:cNvPr>
+          <p:cNvSpPr/>
+          <p:nvPr/>
+        </p:nvSpPr>
+        <p:spPr>
+          <a:xfrm>
+            <a:off x="1084104" y="1935634"/>
+            <a:ext cx="1196282" cy="1134406"/>
+          </a:xfrm>
+          <a:prstGeom prst="flowChartConnector">
+            <a:avLst/>
+          </a:prstGeom>
+        </p:spPr>
+        <p:style>
+          <a:lnRef idx="2">
+            <a:schemeClr val="accent4">
+              <a:shade val="15000"/>
+            </a:schemeClr>
+          </a:lnRef>
+          <a:fillRef idx="1">
+            <a:schemeClr val="accent4"/>
+          </a:fillRef>
+          <a:effectRef idx="0">
+            <a:schemeClr val="accent4"/>
+          </a:effectRef>
+          <a:fontRef idx="minor">
+            <a:schemeClr val="lt1"/>
+          </a:fontRef>
+        </p:style>
+        <p:txBody>
+          <a:bodyPr rtlCol="0" anchor="ctr"/>
+          <a:lstStyle/>
+          <a:p>
+            <a:pPr algn="ctr"/>
+            <a:r>
+              <a:rPr lang="en-US" dirty="0"/>
+              <a:t>Smart Client</a:t>
+            </a:r>
+          </a:p>
+        </p:txBody>
+      </p:sp>
+      <p:sp>
+        <p:nvSpPr>
+          <p:cNvPr id="5" name="Oval 4">
+            <a:extLst>
+              <a:ext uri="{FF2B5EF4-FFF2-40B4-BE49-F238E27FC236}">
+                <a16:creationId xmlns:a16="http://schemas.microsoft.com/office/drawing/2014/main" id="{898B606B-EBAA-7C2C-90E3-4E2AB4C6CC50}"/>
+              </a:ext>
+            </a:extLst>
+          </p:cNvPr>
+          <p:cNvSpPr/>
+          <p:nvPr/>
+        </p:nvSpPr>
+        <p:spPr>
+          <a:xfrm>
+            <a:off x="2280386" y="3956632"/>
+            <a:ext cx="1223784" cy="1134406"/>
+          </a:xfrm>
+          <a:prstGeom prst="ellipse">
+            <a:avLst/>
+          </a:prstGeom>
+          <a:solidFill>
+            <a:schemeClr val="bg1">
+              <a:lumMod val="75000"/>
+            </a:schemeClr>
+          </a:solidFill>
+        </p:spPr>
+        <p:style>
+          <a:lnRef idx="2">
+            <a:schemeClr val="accent4">
+              <a:shade val="15000"/>
+            </a:schemeClr>
+          </a:lnRef>
+          <a:fillRef idx="1">
+            <a:schemeClr val="accent4"/>
+          </a:fillRef>
+          <a:effectRef idx="0">
+            <a:schemeClr val="accent4"/>
+          </a:effectRef>
+          <a:fontRef idx="minor">
+            <a:schemeClr val="lt1"/>
+          </a:fontRef>
+        </p:style>
+        <p:txBody>
+          <a:bodyPr rtlCol="0" anchor="ctr"/>
+          <a:lstStyle/>
+          <a:p>
+            <a:pPr algn="ctr"/>
+            <a:r>
+              <a:rPr lang="en-US" dirty="0"/>
+              <a:t>Visual Client</a:t>
+            </a:r>
+          </a:p>
+        </p:txBody>
+      </p:sp>
+      <p:sp>
+        <p:nvSpPr>
+          <p:cNvPr id="7" name="Flowchart: Connector 6">
+            <a:extLst>
+              <a:ext uri="{FF2B5EF4-FFF2-40B4-BE49-F238E27FC236}">
+                <a16:creationId xmlns:a16="http://schemas.microsoft.com/office/drawing/2014/main" id="{78A0A5CF-3ABF-55FB-6E83-AA58E0B5BABC}"/>
+              </a:ext>
+            </a:extLst>
+          </p:cNvPr>
+          <p:cNvSpPr/>
+          <p:nvPr/>
+        </p:nvSpPr>
+        <p:spPr>
+          <a:xfrm>
+            <a:off x="5833712" y="2123975"/>
+            <a:ext cx="1196282" cy="1134406"/>
+          </a:xfrm>
+          <a:prstGeom prst="flowChartConnector">
+            <a:avLst/>
+          </a:prstGeom>
+        </p:spPr>
+        <p:style>
+          <a:lnRef idx="2">
+            <a:schemeClr val="accent6">
+              <a:shade val="15000"/>
+            </a:schemeClr>
+          </a:lnRef>
+          <a:fillRef idx="1">
+            <a:schemeClr val="accent6"/>
+          </a:fillRef>
+          <a:effectRef idx="0">
+            <a:schemeClr val="accent6"/>
+          </a:effectRef>
+          <a:fontRef idx="minor">
+            <a:schemeClr val="lt1"/>
+          </a:fontRef>
+        </p:style>
+        <p:txBody>
+          <a:bodyPr rtlCol="0" anchor="ctr"/>
+          <a:lstStyle/>
+          <a:p>
+            <a:pPr algn="ctr"/>
+            <a:r>
+              <a:rPr lang="en-US" sz="1200" dirty="0"/>
+              <a:t>Azure Semantic Kernel</a:t>
+            </a:r>
+          </a:p>
+        </p:txBody>
+      </p:sp>
+      <p:sp>
+        <p:nvSpPr>
+          <p:cNvPr id="9" name="Flowchart: Connector 8">
+            <a:extLst>
+              <a:ext uri="{FF2B5EF4-FFF2-40B4-BE49-F238E27FC236}">
+                <a16:creationId xmlns:a16="http://schemas.microsoft.com/office/drawing/2014/main" id="{5C81687D-9073-850F-2709-FCC2BF2ECA82}"/>
+              </a:ext>
+            </a:extLst>
+          </p:cNvPr>
+          <p:cNvSpPr/>
+          <p:nvPr/>
+        </p:nvSpPr>
+        <p:spPr>
+          <a:xfrm>
+            <a:off x="5833712" y="3389429"/>
+            <a:ext cx="1196282" cy="1134406"/>
+          </a:xfrm>
+          <a:prstGeom prst="flowChartConnector">
+            <a:avLst/>
+          </a:prstGeom>
+          <a:solidFill>
+            <a:schemeClr val="accent6">
+              <a:lumMod val="60000"/>
+              <a:lumOff val="40000"/>
+            </a:schemeClr>
+          </a:solidFill>
+        </p:spPr>
+        <p:style>
+          <a:lnRef idx="2">
+            <a:schemeClr val="accent2">
+              <a:shade val="15000"/>
+            </a:schemeClr>
+          </a:lnRef>
+          <a:fillRef idx="1">
+            <a:schemeClr val="accent2"/>
+          </a:fillRef>
+          <a:effectRef idx="0">
+            <a:schemeClr val="accent2"/>
+          </a:effectRef>
+          <a:fontRef idx="minor">
+            <a:schemeClr val="lt1"/>
+          </a:fontRef>
+        </p:style>
+        <p:txBody>
+          <a:bodyPr rtlCol="0" anchor="ctr"/>
+          <a:lstStyle/>
+          <a:p>
+            <a:pPr algn="ctr"/>
+            <a:r>
+              <a:rPr lang="en-US" sz="1600" dirty="0"/>
+              <a:t>LLM </a:t>
+            </a:r>
+          </a:p>
+        </p:txBody>
+      </p:sp>
       <p:grpSp>
         <p:nvGrpSpPr>
           <p:cNvPr id="14" name="Group 13">
             <a:extLst>
               <a:ext uri="{FF2B5EF4-FFF2-40B4-BE49-F238E27FC236}">
-                <a16:creationId xmlns:a16="http://schemas.microsoft.com/office/drawing/2014/main" id="{3D6D7B9A-4E94-46C2-9F7B-20C0CD57957E}"/>
+                <a16:creationId xmlns:a16="http://schemas.microsoft.com/office/drawing/2014/main" id="{0C4C34EC-5CE6-8A56-7D79-26D29AFD4700}"/>
               </a:ext>
             </a:extLst>
           </p:cNvPr>
@@ -3585,7 +4481,7 @@
         </p:nvGrpSpPr>
         <p:grpSpPr>
           <a:xfrm>
-            <a:off x="3760308" y="3438742"/>
+            <a:off x="4029548" y="4342982"/>
             <a:ext cx="1196282" cy="1598480"/>
             <a:chOff x="4183552" y="1914742"/>
             <a:chExt cx="1196282" cy="1598480"/>
@@ -3596,7 +4492,7 @@
             <p:cNvPr id="4" name="Flowchart: Connector 3">
               <a:extLst>
                 <a:ext uri="{FF2B5EF4-FFF2-40B4-BE49-F238E27FC236}">
-                  <a16:creationId xmlns:a16="http://schemas.microsoft.com/office/drawing/2014/main" id="{65740EC3-4A52-287D-E0CF-EDF61766324C}"/>
+                  <a16:creationId xmlns:a16="http://schemas.microsoft.com/office/drawing/2014/main" id="{87BFD776-C2AA-7801-870D-86FFD58C7A5D}"/>
                 </a:ext>
               </a:extLst>
             </p:cNvPr>
@@ -3645,7 +4541,7 @@
             <p:cNvPr id="10" name="Flowchart: Connector 9">
               <a:extLst>
                 <a:ext uri="{FF2B5EF4-FFF2-40B4-BE49-F238E27FC236}">
-                  <a16:creationId xmlns:a16="http://schemas.microsoft.com/office/drawing/2014/main" id="{608CE41C-2FB8-21CA-2264-711C3EF43E77}"/>
+                  <a16:creationId xmlns:a16="http://schemas.microsoft.com/office/drawing/2014/main" id="{57197154-C17C-5C80-6471-4BD0888FEDD6}"/>
                 </a:ext>
               </a:extLst>
             </p:cNvPr>
@@ -3694,7 +4590,7 @@
             <p:cNvPr id="12" name="Straight Connector 11">
               <a:extLst>
                 <a:ext uri="{FF2B5EF4-FFF2-40B4-BE49-F238E27FC236}">
-                  <a16:creationId xmlns:a16="http://schemas.microsoft.com/office/drawing/2014/main" id="{9128A815-CD7C-4342-D0F5-602A25BA6EA0}"/>
+                  <a16:creationId xmlns:a16="http://schemas.microsoft.com/office/drawing/2014/main" id="{B68BB54A-2E82-BF9B-064F-973A8A9AE79F}"/>
                 </a:ext>
               </a:extLst>
             </p:cNvPr>
@@ -3734,7 +4630,7 @@
           <p:cNvPr id="16" name="Straight Arrow Connector 15">
             <a:extLst>
               <a:ext uri="{FF2B5EF4-FFF2-40B4-BE49-F238E27FC236}">
-                <a16:creationId xmlns:a16="http://schemas.microsoft.com/office/drawing/2014/main" id="{AC6ECD2E-5205-21AF-3DCA-9E60A6F3C52D}"/>
+                <a16:creationId xmlns:a16="http://schemas.microsoft.com/office/drawing/2014/main" id="{62FC4131-07A6-C1BE-5131-FAB11A28CD47}"/>
               </a:ext>
             </a:extLst>
           </p:cNvPr>
@@ -3747,7 +4643,7 @@
         </p:nvCxnSpPr>
         <p:spPr>
           <a:xfrm flipH="1">
-            <a:off x="3234930" y="3583121"/>
+            <a:off x="3504170" y="4487361"/>
             <a:ext cx="989452" cy="36474"/>
           </a:xfrm>
           <a:prstGeom prst="straightConnector1">
@@ -3777,7 +4673,7 @@
           <p:cNvPr id="18" name="Straight Arrow Connector 17">
             <a:extLst>
               <a:ext uri="{FF2B5EF4-FFF2-40B4-BE49-F238E27FC236}">
-                <a16:creationId xmlns:a16="http://schemas.microsoft.com/office/drawing/2014/main" id="{F339B734-0745-C2D0-01E9-4C9161B30F1F}"/>
+                <a16:creationId xmlns:a16="http://schemas.microsoft.com/office/drawing/2014/main" id="{7A272AC1-E538-F097-ADF3-689869BCAB9E}"/>
               </a:ext>
             </a:extLst>
           </p:cNvPr>
@@ -3788,9 +4684,9 @@
           <p:nvPr/>
         </p:nvCxnSpPr>
         <p:spPr>
-          <a:xfrm>
-            <a:off x="3760308" y="1786938"/>
-            <a:ext cx="1804164" cy="0"/>
+          <a:xfrm flipV="1">
+            <a:off x="5535214" y="2691178"/>
+            <a:ext cx="298498" cy="87378"/>
           </a:xfrm>
           <a:prstGeom prst="straightConnector1">
             <a:avLst/>
@@ -3820,21 +4716,21 @@
           <p:cNvPr id="20" name="Straight Arrow Connector 19">
             <a:extLst>
               <a:ext uri="{FF2B5EF4-FFF2-40B4-BE49-F238E27FC236}">
-                <a16:creationId xmlns:a16="http://schemas.microsoft.com/office/drawing/2014/main" id="{802C092D-AEDB-A5FC-8F11-A463874C936A}"/>
+                <a16:creationId xmlns:a16="http://schemas.microsoft.com/office/drawing/2014/main" id="{0B5478C4-6E64-E41A-164D-0EB84A857AA2}"/>
               </a:ext>
             </a:extLst>
           </p:cNvPr>
           <p:cNvCxnSpPr>
             <a:cxnSpLocks/>
-            <a:stCxn id="6" idx="5"/>
-            <a:endCxn id="10" idx="1"/>
+            <a:stCxn id="6" idx="4"/>
+            <a:endCxn id="10" idx="0"/>
           </p:cNvCxnSpPr>
           <p:nvPr/>
         </p:nvCxnSpPr>
         <p:spPr>
-          <a:xfrm>
-            <a:off x="3647038" y="2078627"/>
-            <a:ext cx="616611" cy="1402402"/>
+          <a:xfrm flipH="1">
+            <a:off x="4627689" y="3191067"/>
+            <a:ext cx="520796" cy="1151915"/>
           </a:xfrm>
           <a:prstGeom prst="straightConnector1">
             <a:avLst/>
@@ -3864,7 +4760,7 @@
           <p:cNvPr id="24" name="Flowchart: Connector 23">
             <a:extLst>
               <a:ext uri="{FF2B5EF4-FFF2-40B4-BE49-F238E27FC236}">
-                <a16:creationId xmlns:a16="http://schemas.microsoft.com/office/drawing/2014/main" id="{7C2147B3-E070-B0E7-0702-6F1507F0D7EC}"/>
+                <a16:creationId xmlns:a16="http://schemas.microsoft.com/office/drawing/2014/main" id="{494259E6-9C17-F8B9-7893-0C84B82E3BA3}"/>
               </a:ext>
             </a:extLst>
           </p:cNvPr>
@@ -3873,12 +4769,18 @@
         </p:nvSpPr>
         <p:spPr>
           <a:xfrm>
-            <a:off x="5716872" y="2637589"/>
+            <a:off x="5986112" y="3541829"/>
             <a:ext cx="1196282" cy="1134406"/>
           </a:xfrm>
           <a:prstGeom prst="flowChartConnector">
             <a:avLst/>
           </a:prstGeom>
+          <a:solidFill>
+            <a:schemeClr val="accent6">
+              <a:lumMod val="60000"/>
+              <a:lumOff val="40000"/>
+            </a:schemeClr>
+          </a:solidFill>
         </p:spPr>
         <p:style>
           <a:lnRef idx="2">
@@ -3913,7 +4815,7 @@
           <p:cNvPr id="25" name="Flowchart: Connector 24">
             <a:extLst>
               <a:ext uri="{FF2B5EF4-FFF2-40B4-BE49-F238E27FC236}">
-                <a16:creationId xmlns:a16="http://schemas.microsoft.com/office/drawing/2014/main" id="{561D299E-4498-D11F-FCE8-2181549A5D4A}"/>
+                <a16:creationId xmlns:a16="http://schemas.microsoft.com/office/drawing/2014/main" id="{F9C8D887-6EF9-F268-7C78-C688A51538AE}"/>
               </a:ext>
             </a:extLst>
           </p:cNvPr>
@@ -3922,12 +4824,18 @@
         </p:nvSpPr>
         <p:spPr>
           <a:xfrm>
-            <a:off x="5869272" y="2789989"/>
+            <a:off x="6138512" y="3694229"/>
             <a:ext cx="1196282" cy="1134406"/>
           </a:xfrm>
           <a:prstGeom prst="flowChartConnector">
             <a:avLst/>
           </a:prstGeom>
+          <a:solidFill>
+            <a:schemeClr val="accent6">
+              <a:lumMod val="60000"/>
+              <a:lumOff val="40000"/>
+            </a:schemeClr>
+          </a:solidFill>
         </p:spPr>
         <p:style>
           <a:lnRef idx="2">
@@ -3957,10 +4865,280 @@
           </a:p>
         </p:txBody>
       </p:sp>
+      <p:sp>
+        <p:nvSpPr>
+          <p:cNvPr id="26" name="Title 25">
+            <a:extLst>
+              <a:ext uri="{FF2B5EF4-FFF2-40B4-BE49-F238E27FC236}">
+                <a16:creationId xmlns:a16="http://schemas.microsoft.com/office/drawing/2014/main" id="{033B8EC4-4F1A-E1E7-33EF-E6B3D3B5F25E}"/>
+              </a:ext>
+            </a:extLst>
+          </p:cNvPr>
+          <p:cNvSpPr>
+            <a:spLocks noGrp="1"/>
+          </p:cNvSpPr>
+          <p:nvPr>
+            <p:ph type="title"/>
+          </p:nvPr>
+        </p:nvSpPr>
+        <p:spPr/>
+        <p:txBody>
+          <a:bodyPr/>
+          <a:lstStyle/>
+          <a:p>
+            <a:r>
+              <a:rPr lang="en-US" dirty="0"/>
+              <a:t>A Better Architecture</a:t>
+            </a:r>
+          </a:p>
+        </p:txBody>
+      </p:sp>
+      <p:sp>
+        <p:nvSpPr>
+          <p:cNvPr id="11" name="Oval 10">
+            <a:extLst>
+              <a:ext uri="{FF2B5EF4-FFF2-40B4-BE49-F238E27FC236}">
+                <a16:creationId xmlns:a16="http://schemas.microsoft.com/office/drawing/2014/main" id="{7073BB61-EC92-7F4D-F679-E3C004C5C1C4}"/>
+              </a:ext>
+            </a:extLst>
+          </p:cNvPr>
+          <p:cNvSpPr/>
+          <p:nvPr/>
+        </p:nvSpPr>
+        <p:spPr>
+          <a:xfrm>
+            <a:off x="3767593" y="1919859"/>
+            <a:ext cx="1223784" cy="1134406"/>
+          </a:xfrm>
+          <a:prstGeom prst="ellipse">
+            <a:avLst/>
+          </a:prstGeom>
+          <a:solidFill>
+            <a:schemeClr val="accent2"/>
+          </a:solidFill>
+        </p:spPr>
+        <p:style>
+          <a:lnRef idx="2">
+            <a:schemeClr val="accent4">
+              <a:shade val="15000"/>
+            </a:schemeClr>
+          </a:lnRef>
+          <a:fillRef idx="1">
+            <a:schemeClr val="accent4"/>
+          </a:fillRef>
+          <a:effectRef idx="0">
+            <a:schemeClr val="accent4"/>
+          </a:effectRef>
+          <a:fontRef idx="minor">
+            <a:schemeClr val="lt1"/>
+          </a:fontRef>
+        </p:style>
+        <p:txBody>
+          <a:bodyPr rtlCol="0" anchor="ctr"/>
+          <a:lstStyle/>
+          <a:p>
+            <a:pPr algn="ctr"/>
+            <a:r>
+              <a:rPr lang="en-US" sz="1600" dirty="0"/>
+              <a:t>Smart Service</a:t>
+            </a:r>
+          </a:p>
+        </p:txBody>
+      </p:sp>
+      <p:sp>
+        <p:nvSpPr>
+          <p:cNvPr id="6" name="Flowchart: Connector 5">
+            <a:extLst>
+              <a:ext uri="{FF2B5EF4-FFF2-40B4-BE49-F238E27FC236}">
+                <a16:creationId xmlns:a16="http://schemas.microsoft.com/office/drawing/2014/main" id="{7D081192-6007-AE4E-507E-B5C60CF667A4}"/>
+              </a:ext>
+            </a:extLst>
+          </p:cNvPr>
+          <p:cNvSpPr/>
+          <p:nvPr/>
+        </p:nvSpPr>
+        <p:spPr>
+          <a:xfrm>
+            <a:off x="4761755" y="2366044"/>
+            <a:ext cx="773459" cy="825023"/>
+          </a:xfrm>
+          <a:prstGeom prst="flowChartConnector">
+            <a:avLst/>
+          </a:prstGeom>
+        </p:spPr>
+        <p:style>
+          <a:lnRef idx="2">
+            <a:schemeClr val="accent1">
+              <a:shade val="15000"/>
+            </a:schemeClr>
+          </a:lnRef>
+          <a:fillRef idx="1">
+            <a:schemeClr val="accent1"/>
+          </a:fillRef>
+          <a:effectRef idx="0">
+            <a:schemeClr val="accent1"/>
+          </a:effectRef>
+          <a:fontRef idx="minor">
+            <a:schemeClr val="lt1"/>
+          </a:fontRef>
+        </p:style>
+        <p:txBody>
+          <a:bodyPr rtlCol="0" anchor="ctr"/>
+          <a:lstStyle/>
+          <a:p>
+            <a:pPr algn="ctr"/>
+            <a:r>
+              <a:rPr lang="en-US" sz="1050" dirty="0"/>
+              <a:t>Plugin</a:t>
+            </a:r>
+          </a:p>
+        </p:txBody>
+      </p:sp>
+      <p:cxnSp>
+        <p:nvCxnSpPr>
+          <p:cNvPr id="21" name="Straight Arrow Connector 20">
+            <a:extLst>
+              <a:ext uri="{FF2B5EF4-FFF2-40B4-BE49-F238E27FC236}">
+                <a16:creationId xmlns:a16="http://schemas.microsoft.com/office/drawing/2014/main" id="{BBA7DA60-4976-9E24-6C3D-AE6B52360B1A}"/>
+              </a:ext>
+            </a:extLst>
+          </p:cNvPr>
+          <p:cNvCxnSpPr>
+            <a:cxnSpLocks/>
+            <a:stCxn id="6" idx="5"/>
+            <a:endCxn id="9" idx="1"/>
+          </p:cNvCxnSpPr>
+          <p:nvPr/>
+        </p:nvCxnSpPr>
+        <p:spPr>
+          <a:xfrm>
+            <a:off x="5421944" y="3070245"/>
+            <a:ext cx="586959" cy="485314"/>
+          </a:xfrm>
+          <a:prstGeom prst="straightConnector1">
+            <a:avLst/>
+          </a:prstGeom>
+          <a:ln>
+            <a:headEnd type="triangle"/>
+            <a:tailEnd type="triangle"/>
+          </a:ln>
+        </p:spPr>
+        <p:style>
+          <a:lnRef idx="2">
+            <a:schemeClr val="accent1"/>
+          </a:lnRef>
+          <a:fillRef idx="0">
+            <a:schemeClr val="accent1"/>
+          </a:fillRef>
+          <a:effectRef idx="1">
+            <a:schemeClr val="accent1"/>
+          </a:effectRef>
+          <a:fontRef idx="minor">
+            <a:schemeClr val="tx1"/>
+          </a:fontRef>
+        </p:style>
+      </p:cxnSp>
+      <p:cxnSp>
+        <p:nvCxnSpPr>
+          <p:cNvPr id="27" name="Straight Arrow Connector 26">
+            <a:extLst>
+              <a:ext uri="{FF2B5EF4-FFF2-40B4-BE49-F238E27FC236}">
+                <a16:creationId xmlns:a16="http://schemas.microsoft.com/office/drawing/2014/main" id="{648B1616-4651-B6C8-6F2C-6784853686C4}"/>
+              </a:ext>
+            </a:extLst>
+          </p:cNvPr>
+          <p:cNvCxnSpPr>
+            <a:cxnSpLocks/>
+            <a:stCxn id="8" idx="6"/>
+            <a:endCxn id="11" idx="2"/>
+          </p:cNvCxnSpPr>
+          <p:nvPr/>
+        </p:nvCxnSpPr>
+        <p:spPr>
+          <a:xfrm flipV="1">
+            <a:off x="2280386" y="2487062"/>
+            <a:ext cx="1487207" cy="15775"/>
+          </a:xfrm>
+          <a:prstGeom prst="straightConnector1">
+            <a:avLst/>
+          </a:prstGeom>
+          <a:ln>
+            <a:headEnd type="triangle"/>
+            <a:tailEnd type="triangle"/>
+          </a:ln>
+        </p:spPr>
+        <p:style>
+          <a:lnRef idx="2">
+            <a:schemeClr val="accent1"/>
+          </a:lnRef>
+          <a:fillRef idx="0">
+            <a:schemeClr val="accent1"/>
+          </a:fillRef>
+          <a:effectRef idx="1">
+            <a:schemeClr val="accent1"/>
+          </a:effectRef>
+          <a:fontRef idx="minor">
+            <a:schemeClr val="tx1"/>
+          </a:fontRef>
+        </p:style>
+      </p:cxnSp>
+      <p:sp>
+        <p:nvSpPr>
+          <p:cNvPr id="2" name="Speech Bubble: Rectangle with Corners Rounded 1">
+            <a:extLst>
+              <a:ext uri="{FF2B5EF4-FFF2-40B4-BE49-F238E27FC236}">
+                <a16:creationId xmlns:a16="http://schemas.microsoft.com/office/drawing/2014/main" id="{00602240-7FDF-FEB1-0C1A-01E78786B588}"/>
+              </a:ext>
+            </a:extLst>
+          </p:cNvPr>
+          <p:cNvSpPr/>
+          <p:nvPr/>
+        </p:nvSpPr>
+        <p:spPr>
+          <a:xfrm>
+            <a:off x="4216115" y="1480568"/>
+            <a:ext cx="1409564" cy="385437"/>
+          </a:xfrm>
+          <a:prstGeom prst="wedgeRoundRectCallout">
+            <a:avLst>
+              <a:gd name="adj1" fmla="val -20833"/>
+              <a:gd name="adj2" fmla="val 92299"/>
+              <a:gd name="adj3" fmla="val 16667"/>
+            </a:avLst>
+          </a:prstGeom>
+        </p:spPr>
+        <p:style>
+          <a:lnRef idx="2">
+            <a:schemeClr val="accent4">
+              <a:shade val="15000"/>
+            </a:schemeClr>
+          </a:lnRef>
+          <a:fillRef idx="1">
+            <a:schemeClr val="accent4"/>
+          </a:fillRef>
+          <a:effectRef idx="0">
+            <a:schemeClr val="accent4"/>
+          </a:effectRef>
+          <a:fontRef idx="minor">
+            <a:schemeClr val="lt1"/>
+          </a:fontRef>
+        </p:style>
+        <p:txBody>
+          <a:bodyPr rtlCol="0" anchor="ctr"/>
+          <a:lstStyle/>
+          <a:p>
+            <a:pPr algn="ctr"/>
+            <a:r>
+              <a:rPr lang="en-US" sz="800" dirty="0"/>
+              <a:t>Handles authentication, secure Keys…</a:t>
+            </a:r>
+          </a:p>
+        </p:txBody>
+      </p:sp>
     </p:spTree>
     <p:extLst>
       <p:ext uri="{BB962C8B-B14F-4D97-AF65-F5344CB8AC3E}">
-        <p14:creationId xmlns:p14="http://schemas.microsoft.com/office/powerpoint/2010/main" val="2821312262"/>
+        <p14:creationId xmlns:p14="http://schemas.microsoft.com/office/powerpoint/2010/main" val="3438194066"/>
       </p:ext>
     </p:extLst>
   </p:cSld>

</xml_diff>

<commit_message>
Enhance AI Kernel Client UI and functionality
Updated project files to improve user interface and functionality. Key changes include a redesign of `MainPage` using a `Grid`, addition of `MainPageViewModel` for MVVM support, and new image resources. The splash screen size was increased, and a new package for OpenAPI integration was added. Error handling in `Program.cs` was improved, and several SVG icons were updated. Removed the `HostedMinimalAPI.cs` file and updated API endpoints in `LightsControllerAPI.http`. Overall, these changes enhance maintainability and user experience.
</commit_message>
<xml_diff>
--- a/AI Friendly APIs.pptx
+++ b/AI Friendly APIs.pptx
@@ -6,7 +6,8 @@
   </p:sldMasterIdLst>
   <p:sldIdLst>
     <p:sldId id="256" r:id="rId2"/>
-    <p:sldId id="257" r:id="rId3"/>
+    <p:sldId id="258" r:id="rId3"/>
+    <p:sldId id="257" r:id="rId4"/>
   </p:sldIdLst>
   <p:sldSz cx="12192000" cy="6858000"/>
   <p:notesSz cx="6858000" cy="9144000"/>
@@ -260,7 +261,7 @@
           <a:p>
             <a:fld id="{9564C4B6-AF8B-47D1-A3BA-C9921D51DAF6}" type="datetimeFigureOut">
               <a:rPr lang="en-US" smtClean="0"/>
-              <a:t>2/1/2025</a:t>
+              <a:t>2/6/2025</a:t>
             </a:fld>
             <a:endParaRPr lang="en-US"/>
           </a:p>
@@ -458,7 +459,7 @@
           <a:p>
             <a:fld id="{9564C4B6-AF8B-47D1-A3BA-C9921D51DAF6}" type="datetimeFigureOut">
               <a:rPr lang="en-US" smtClean="0"/>
-              <a:t>2/1/2025</a:t>
+              <a:t>2/6/2025</a:t>
             </a:fld>
             <a:endParaRPr lang="en-US"/>
           </a:p>
@@ -666,7 +667,7 @@
           <a:p>
             <a:fld id="{9564C4B6-AF8B-47D1-A3BA-C9921D51DAF6}" type="datetimeFigureOut">
               <a:rPr lang="en-US" smtClean="0"/>
-              <a:t>2/1/2025</a:t>
+              <a:t>2/6/2025</a:t>
             </a:fld>
             <a:endParaRPr lang="en-US"/>
           </a:p>
@@ -864,7 +865,7 @@
           <a:p>
             <a:fld id="{9564C4B6-AF8B-47D1-A3BA-C9921D51DAF6}" type="datetimeFigureOut">
               <a:rPr lang="en-US" smtClean="0"/>
-              <a:t>2/1/2025</a:t>
+              <a:t>2/6/2025</a:t>
             </a:fld>
             <a:endParaRPr lang="en-US"/>
           </a:p>
@@ -1139,7 +1140,7 @@
           <a:p>
             <a:fld id="{9564C4B6-AF8B-47D1-A3BA-C9921D51DAF6}" type="datetimeFigureOut">
               <a:rPr lang="en-US" smtClean="0"/>
-              <a:t>2/1/2025</a:t>
+              <a:t>2/6/2025</a:t>
             </a:fld>
             <a:endParaRPr lang="en-US"/>
           </a:p>
@@ -1404,7 +1405,7 @@
           <a:p>
             <a:fld id="{9564C4B6-AF8B-47D1-A3BA-C9921D51DAF6}" type="datetimeFigureOut">
               <a:rPr lang="en-US" smtClean="0"/>
-              <a:t>2/1/2025</a:t>
+              <a:t>2/6/2025</a:t>
             </a:fld>
             <a:endParaRPr lang="en-US"/>
           </a:p>
@@ -1816,7 +1817,7 @@
           <a:p>
             <a:fld id="{9564C4B6-AF8B-47D1-A3BA-C9921D51DAF6}" type="datetimeFigureOut">
               <a:rPr lang="en-US" smtClean="0"/>
-              <a:t>2/1/2025</a:t>
+              <a:t>2/6/2025</a:t>
             </a:fld>
             <a:endParaRPr lang="en-US"/>
           </a:p>
@@ -1957,7 +1958,7 @@
           <a:p>
             <a:fld id="{9564C4B6-AF8B-47D1-A3BA-C9921D51DAF6}" type="datetimeFigureOut">
               <a:rPr lang="en-US" smtClean="0"/>
-              <a:t>2/1/2025</a:t>
+              <a:t>2/6/2025</a:t>
             </a:fld>
             <a:endParaRPr lang="en-US"/>
           </a:p>
@@ -2070,7 +2071,7 @@
           <a:p>
             <a:fld id="{9564C4B6-AF8B-47D1-A3BA-C9921D51DAF6}" type="datetimeFigureOut">
               <a:rPr lang="en-US" smtClean="0"/>
-              <a:t>2/1/2025</a:t>
+              <a:t>2/6/2025</a:t>
             </a:fld>
             <a:endParaRPr lang="en-US"/>
           </a:p>
@@ -2381,7 +2382,7 @@
           <a:p>
             <a:fld id="{9564C4B6-AF8B-47D1-A3BA-C9921D51DAF6}" type="datetimeFigureOut">
               <a:rPr lang="en-US" smtClean="0"/>
-              <a:t>2/1/2025</a:t>
+              <a:t>2/6/2025</a:t>
             </a:fld>
             <a:endParaRPr lang="en-US"/>
           </a:p>
@@ -2669,7 +2670,7 @@
           <a:p>
             <a:fld id="{9564C4B6-AF8B-47D1-A3BA-C9921D51DAF6}" type="datetimeFigureOut">
               <a:rPr lang="en-US" smtClean="0"/>
-              <a:t>2/1/2025</a:t>
+              <a:t>2/6/2025</a:t>
             </a:fld>
             <a:endParaRPr lang="en-US"/>
           </a:p>
@@ -2910,7 +2911,7 @@
           <a:p>
             <a:fld id="{9564C4B6-AF8B-47D1-A3BA-C9921D51DAF6}" type="datetimeFigureOut">
               <a:rPr lang="en-US" smtClean="0"/>
-              <a:t>2/1/2025</a:t>
+              <a:t>2/6/2025</a:t>
             </a:fld>
             <a:endParaRPr lang="en-US"/>
           </a:p>
@@ -3493,8 +3494,8 @@
         </p:nvSpPr>
         <p:spPr>
           <a:xfrm>
-            <a:off x="5833712" y="2123975"/>
-            <a:ext cx="1196282" cy="1134406"/>
+            <a:off x="1461448" y="1981012"/>
+            <a:ext cx="873171" cy="870360"/>
           </a:xfrm>
           <a:prstGeom prst="flowChartConnector">
             <a:avLst/>
@@ -3522,7 +3523,7 @@
           <a:p>
             <a:pPr algn="ctr"/>
             <a:r>
-              <a:rPr lang="en-US" sz="1200" dirty="0"/>
+              <a:rPr lang="en-US" sz="800" dirty="0"/>
               <a:t>Azure Semantic Kernel</a:t>
             </a:r>
           </a:p>
@@ -3765,29 +3766,1178 @@
       </p:cxnSp>
       <p:cxnSp>
         <p:nvCxnSpPr>
-          <p:cNvPr id="18" name="Straight Arrow Connector 17">
-            <a:extLst>
-              <a:ext uri="{FF2B5EF4-FFF2-40B4-BE49-F238E27FC236}">
-                <a16:creationId xmlns:a16="http://schemas.microsoft.com/office/drawing/2014/main" id="{F339B734-0745-C2D0-01E9-4C9161B30F1F}"/>
+          <p:cNvPr id="20" name="Straight Arrow Connector 19">
+            <a:extLst>
+              <a:ext uri="{FF2B5EF4-FFF2-40B4-BE49-F238E27FC236}">
+                <a16:creationId xmlns:a16="http://schemas.microsoft.com/office/drawing/2014/main" id="{802C092D-AEDB-A5FC-8F11-A463874C936A}"/>
               </a:ext>
             </a:extLst>
           </p:cNvPr>
           <p:cNvCxnSpPr>
-            <a:stCxn id="6" idx="6"/>
-            <a:endCxn id="7" idx="2"/>
+            <a:cxnSpLocks/>
+            <a:stCxn id="6" idx="5"/>
+            <a:endCxn id="10" idx="1"/>
           </p:cNvCxnSpPr>
           <p:nvPr/>
         </p:nvCxnSpPr>
         <p:spPr>
           <a:xfrm>
-            <a:off x="4029548" y="2691178"/>
-            <a:ext cx="1804164" cy="0"/>
+            <a:off x="3916278" y="2982867"/>
+            <a:ext cx="616611" cy="1402402"/>
           </a:xfrm>
           <a:prstGeom prst="straightConnector1">
             <a:avLst/>
           </a:prstGeom>
           <a:ln>
             <a:headEnd type="triangle"/>
+            <a:tailEnd type="triangle"/>
+          </a:ln>
+        </p:spPr>
+        <p:style>
+          <a:lnRef idx="2">
+            <a:schemeClr val="accent1"/>
+          </a:lnRef>
+          <a:fillRef idx="0">
+            <a:schemeClr val="accent1"/>
+          </a:fillRef>
+          <a:effectRef idx="1">
+            <a:schemeClr val="accent1"/>
+          </a:effectRef>
+          <a:fontRef idx="minor">
+            <a:schemeClr val="tx1"/>
+          </a:fontRef>
+        </p:style>
+      </p:cxnSp>
+      <p:sp>
+        <p:nvSpPr>
+          <p:cNvPr id="24" name="Flowchart: Connector 23">
+            <a:extLst>
+              <a:ext uri="{FF2B5EF4-FFF2-40B4-BE49-F238E27FC236}">
+                <a16:creationId xmlns:a16="http://schemas.microsoft.com/office/drawing/2014/main" id="{7C2147B3-E070-B0E7-0702-6F1507F0D7EC}"/>
+              </a:ext>
+            </a:extLst>
+          </p:cNvPr>
+          <p:cNvSpPr/>
+          <p:nvPr/>
+        </p:nvSpPr>
+        <p:spPr>
+          <a:xfrm>
+            <a:off x="5986112" y="3541829"/>
+            <a:ext cx="1196282" cy="1134406"/>
+          </a:xfrm>
+          <a:prstGeom prst="flowChartConnector">
+            <a:avLst/>
+          </a:prstGeom>
+          <a:solidFill>
+            <a:schemeClr val="accent6">
+              <a:lumMod val="60000"/>
+              <a:lumOff val="40000"/>
+            </a:schemeClr>
+          </a:solidFill>
+        </p:spPr>
+        <p:style>
+          <a:lnRef idx="2">
+            <a:schemeClr val="accent2">
+              <a:shade val="15000"/>
+            </a:schemeClr>
+          </a:lnRef>
+          <a:fillRef idx="1">
+            <a:schemeClr val="accent2"/>
+          </a:fillRef>
+          <a:effectRef idx="0">
+            <a:schemeClr val="accent2"/>
+          </a:effectRef>
+          <a:fontRef idx="minor">
+            <a:schemeClr val="lt1"/>
+          </a:fontRef>
+        </p:style>
+        <p:txBody>
+          <a:bodyPr rtlCol="0" anchor="ctr"/>
+          <a:lstStyle/>
+          <a:p>
+            <a:pPr algn="ctr"/>
+            <a:r>
+              <a:rPr lang="en-US" sz="1600" dirty="0"/>
+              <a:t>LLM </a:t>
+            </a:r>
+          </a:p>
+        </p:txBody>
+      </p:sp>
+      <p:sp>
+        <p:nvSpPr>
+          <p:cNvPr id="25" name="Flowchart: Connector 24">
+            <a:extLst>
+              <a:ext uri="{FF2B5EF4-FFF2-40B4-BE49-F238E27FC236}">
+                <a16:creationId xmlns:a16="http://schemas.microsoft.com/office/drawing/2014/main" id="{561D299E-4498-D11F-FCE8-2181549A5D4A}"/>
+              </a:ext>
+            </a:extLst>
+          </p:cNvPr>
+          <p:cNvSpPr/>
+          <p:nvPr/>
+        </p:nvSpPr>
+        <p:spPr>
+          <a:xfrm>
+            <a:off x="6138512" y="3694229"/>
+            <a:ext cx="1196282" cy="1134406"/>
+          </a:xfrm>
+          <a:prstGeom prst="flowChartConnector">
+            <a:avLst/>
+          </a:prstGeom>
+          <a:solidFill>
+            <a:schemeClr val="accent6">
+              <a:lumMod val="60000"/>
+              <a:lumOff val="40000"/>
+            </a:schemeClr>
+          </a:solidFill>
+        </p:spPr>
+        <p:style>
+          <a:lnRef idx="2">
+            <a:schemeClr val="accent2">
+              <a:shade val="15000"/>
+            </a:schemeClr>
+          </a:lnRef>
+          <a:fillRef idx="1">
+            <a:schemeClr val="accent2"/>
+          </a:fillRef>
+          <a:effectRef idx="0">
+            <a:schemeClr val="accent2"/>
+          </a:effectRef>
+          <a:fontRef idx="minor">
+            <a:schemeClr val="lt1"/>
+          </a:fontRef>
+        </p:style>
+        <p:txBody>
+          <a:bodyPr rtlCol="0" anchor="ctr"/>
+          <a:lstStyle/>
+          <a:p>
+            <a:pPr algn="ctr"/>
+            <a:r>
+              <a:rPr lang="en-US" sz="1600" dirty="0"/>
+              <a:t>Azure</a:t>
+            </a:r>
+          </a:p>
+          <a:p>
+            <a:pPr algn="ctr"/>
+            <a:r>
+              <a:rPr lang="en-US" sz="1600" dirty="0"/>
+              <a:t>Google… </a:t>
+            </a:r>
+          </a:p>
+        </p:txBody>
+      </p:sp>
+      <p:sp>
+        <p:nvSpPr>
+          <p:cNvPr id="26" name="Title 25">
+            <a:extLst>
+              <a:ext uri="{FF2B5EF4-FFF2-40B4-BE49-F238E27FC236}">
+                <a16:creationId xmlns:a16="http://schemas.microsoft.com/office/drawing/2014/main" id="{37B2E8B5-2048-C69A-7E08-BABE8BCC8F84}"/>
+              </a:ext>
+            </a:extLst>
+          </p:cNvPr>
+          <p:cNvSpPr>
+            <a:spLocks noGrp="1"/>
+          </p:cNvSpPr>
+          <p:nvPr>
+            <p:ph type="title"/>
+          </p:nvPr>
+        </p:nvSpPr>
+        <p:spPr/>
+        <p:txBody>
+          <a:bodyPr/>
+          <a:lstStyle/>
+          <a:p>
+            <a:r>
+              <a:rPr lang="en-US" dirty="0"/>
+              <a:t>Demo Architecture</a:t>
+            </a:r>
+          </a:p>
+        </p:txBody>
+      </p:sp>
+      <p:cxnSp>
+        <p:nvCxnSpPr>
+          <p:cNvPr id="27" name="Straight Arrow Connector 26">
+            <a:extLst>
+              <a:ext uri="{FF2B5EF4-FFF2-40B4-BE49-F238E27FC236}">
+                <a16:creationId xmlns:a16="http://schemas.microsoft.com/office/drawing/2014/main" id="{BD1BA78F-8189-91BF-EC65-61D762BAD9A1}"/>
+              </a:ext>
+            </a:extLst>
+          </p:cNvPr>
+          <p:cNvCxnSpPr>
+            <a:cxnSpLocks/>
+            <a:stCxn id="6" idx="6"/>
+            <a:endCxn id="2" idx="2"/>
+          </p:cNvCxnSpPr>
+          <p:nvPr/>
+        </p:nvCxnSpPr>
+        <p:spPr>
+          <a:xfrm>
+            <a:off x="4029548" y="2691178"/>
+            <a:ext cx="1849821" cy="211202"/>
+          </a:xfrm>
+          <a:prstGeom prst="straightConnector1">
+            <a:avLst/>
+          </a:prstGeom>
+          <a:ln>
+            <a:headEnd type="triangle"/>
+            <a:tailEnd type="triangle"/>
+          </a:ln>
+        </p:spPr>
+        <p:style>
+          <a:lnRef idx="2">
+            <a:schemeClr val="accent1"/>
+          </a:lnRef>
+          <a:fillRef idx="0">
+            <a:schemeClr val="accent1"/>
+          </a:fillRef>
+          <a:effectRef idx="1">
+            <a:schemeClr val="accent1"/>
+          </a:effectRef>
+          <a:fontRef idx="minor">
+            <a:schemeClr val="tx1"/>
+          </a:fontRef>
+        </p:style>
+      </p:cxnSp>
+      <p:sp>
+        <p:nvSpPr>
+          <p:cNvPr id="30" name="TextBox 29">
+            <a:extLst>
+              <a:ext uri="{FF2B5EF4-FFF2-40B4-BE49-F238E27FC236}">
+                <a16:creationId xmlns:a16="http://schemas.microsoft.com/office/drawing/2014/main" id="{D7280BAD-DE7F-9C53-0345-4B409203D7BD}"/>
+              </a:ext>
+            </a:extLst>
+          </p:cNvPr>
+          <p:cNvSpPr txBox="1"/>
+          <p:nvPr/>
+        </p:nvSpPr>
+        <p:spPr>
+          <a:xfrm>
+            <a:off x="8366760" y="492760"/>
+            <a:ext cx="3426650" cy="1200329"/>
+          </a:xfrm>
+          <a:prstGeom prst="rect">
+            <a:avLst/>
+          </a:prstGeom>
+          <a:noFill/>
+        </p:spPr>
+        <p:txBody>
+          <a:bodyPr wrap="square" rtlCol="0">
+            <a:spAutoFit/>
+          </a:bodyPr>
+          <a:lstStyle/>
+          <a:p>
+            <a:r>
+              <a:rPr lang="en-US" dirty="0" err="1"/>
+              <a:t>OpenAPI</a:t>
+            </a:r>
+            <a:endParaRPr lang="en-US" dirty="0"/>
+          </a:p>
+          <a:p>
+            <a:r>
+              <a:rPr lang="en-US" dirty="0"/>
+              <a:t>Semantic Kernel</a:t>
+            </a:r>
+          </a:p>
+          <a:p>
+            <a:r>
+              <a:rPr lang="en-US" dirty="0"/>
+              <a:t>	OpenAI Connector</a:t>
+            </a:r>
+          </a:p>
+          <a:p>
+            <a:r>
+              <a:rPr lang="en-US" dirty="0"/>
+              <a:t>Copilot GPT</a:t>
+            </a:r>
+          </a:p>
+        </p:txBody>
+      </p:sp>
+      <p:sp>
+        <p:nvSpPr>
+          <p:cNvPr id="31" name="Flowchart: Connector 30">
+            <a:extLst>
+              <a:ext uri="{FF2B5EF4-FFF2-40B4-BE49-F238E27FC236}">
+                <a16:creationId xmlns:a16="http://schemas.microsoft.com/office/drawing/2014/main" id="{F01D0EA4-0051-399D-7E42-B7B4CD9CF432}"/>
+              </a:ext>
+            </a:extLst>
+          </p:cNvPr>
+          <p:cNvSpPr/>
+          <p:nvPr/>
+        </p:nvSpPr>
+        <p:spPr>
+          <a:xfrm>
+            <a:off x="4781101" y="4351003"/>
+            <a:ext cx="268133" cy="288757"/>
+          </a:xfrm>
+          <a:prstGeom prst="flowChartConnector">
+            <a:avLst/>
+          </a:prstGeom>
+          <a:solidFill>
+            <a:schemeClr val="accent2">
+              <a:lumMod val="60000"/>
+              <a:lumOff val="40000"/>
+            </a:schemeClr>
+          </a:solidFill>
+        </p:spPr>
+        <p:style>
+          <a:lnRef idx="2">
+            <a:schemeClr val="accent1">
+              <a:shade val="15000"/>
+            </a:schemeClr>
+          </a:lnRef>
+          <a:fillRef idx="1">
+            <a:schemeClr val="accent1"/>
+          </a:fillRef>
+          <a:effectRef idx="0">
+            <a:schemeClr val="accent1"/>
+          </a:effectRef>
+          <a:fontRef idx="minor">
+            <a:schemeClr val="lt1"/>
+          </a:fontRef>
+        </p:style>
+        <p:txBody>
+          <a:bodyPr rtlCol="0" anchor="ctr"/>
+          <a:lstStyle/>
+          <a:p>
+            <a:pPr algn="ctr"/>
+            <a:endParaRPr lang="en-US"/>
+          </a:p>
+        </p:txBody>
+      </p:sp>
+      <p:cxnSp>
+        <p:nvCxnSpPr>
+          <p:cNvPr id="32" name="Straight Arrow Connector 31">
+            <a:extLst>
+              <a:ext uri="{FF2B5EF4-FFF2-40B4-BE49-F238E27FC236}">
+                <a16:creationId xmlns:a16="http://schemas.microsoft.com/office/drawing/2014/main" id="{AE0D0D00-42C9-4955-16C2-F0FD724DE75B}"/>
+              </a:ext>
+            </a:extLst>
+          </p:cNvPr>
+          <p:cNvCxnSpPr>
+            <a:cxnSpLocks/>
+            <a:stCxn id="6" idx="5"/>
+            <a:endCxn id="31" idx="0"/>
+          </p:cNvCxnSpPr>
+          <p:nvPr/>
+        </p:nvCxnSpPr>
+        <p:spPr>
+          <a:xfrm>
+            <a:off x="3916278" y="2982867"/>
+            <a:ext cx="998890" cy="1368136"/>
+          </a:xfrm>
+          <a:prstGeom prst="straightConnector1">
+            <a:avLst/>
+          </a:prstGeom>
+          <a:ln>
+            <a:headEnd type="triangle"/>
+            <a:tailEnd type="triangle"/>
+          </a:ln>
+        </p:spPr>
+        <p:style>
+          <a:lnRef idx="2">
+            <a:schemeClr val="accent1"/>
+          </a:lnRef>
+          <a:fillRef idx="0">
+            <a:schemeClr val="accent1"/>
+          </a:fillRef>
+          <a:effectRef idx="1">
+            <a:schemeClr val="accent1"/>
+          </a:effectRef>
+          <a:fontRef idx="minor">
+            <a:schemeClr val="tx1"/>
+          </a:fontRef>
+        </p:style>
+      </p:cxnSp>
+      <p:sp>
+        <p:nvSpPr>
+          <p:cNvPr id="36" name="TextBox 35">
+            <a:extLst>
+              <a:ext uri="{FF2B5EF4-FFF2-40B4-BE49-F238E27FC236}">
+                <a16:creationId xmlns:a16="http://schemas.microsoft.com/office/drawing/2014/main" id="{B0F7B519-F416-399B-D122-16B1BBB59AE9}"/>
+              </a:ext>
+            </a:extLst>
+          </p:cNvPr>
+          <p:cNvSpPr txBox="1"/>
+          <p:nvPr/>
+        </p:nvSpPr>
+        <p:spPr>
+          <a:xfrm>
+            <a:off x="5000734" y="4249948"/>
+            <a:ext cx="859531" cy="415498"/>
+          </a:xfrm>
+          <a:prstGeom prst="rect">
+            <a:avLst/>
+          </a:prstGeom>
+          <a:noFill/>
+        </p:spPr>
+        <p:txBody>
+          <a:bodyPr wrap="none" rtlCol="0">
+            <a:spAutoFit/>
+          </a:bodyPr>
+          <a:lstStyle/>
+          <a:p>
+            <a:r>
+              <a:rPr lang="en-US" sz="1050" dirty="0" err="1"/>
+              <a:t>OpenAPI</a:t>
+            </a:r>
+            <a:endParaRPr lang="en-US" sz="1050" dirty="0"/>
+          </a:p>
+          <a:p>
+            <a:r>
+              <a:rPr lang="en-US" sz="1050" dirty="0"/>
+              <a:t>Description</a:t>
+            </a:r>
+          </a:p>
+        </p:txBody>
+      </p:sp>
+      <p:sp>
+        <p:nvSpPr>
+          <p:cNvPr id="2" name="Flowchart: Connector 1">
+            <a:extLst>
+              <a:ext uri="{FF2B5EF4-FFF2-40B4-BE49-F238E27FC236}">
+                <a16:creationId xmlns:a16="http://schemas.microsoft.com/office/drawing/2014/main" id="{A540A1A9-AFC8-942F-3996-5FD91067D749}"/>
+              </a:ext>
+            </a:extLst>
+          </p:cNvPr>
+          <p:cNvSpPr/>
+          <p:nvPr/>
+        </p:nvSpPr>
+        <p:spPr>
+          <a:xfrm>
+            <a:off x="5879369" y="2323508"/>
+            <a:ext cx="1227934" cy="1157743"/>
+          </a:xfrm>
+          <a:prstGeom prst="flowChartConnector">
+            <a:avLst/>
+          </a:prstGeom>
+          <a:solidFill>
+            <a:schemeClr val="accent6">
+              <a:lumMod val="60000"/>
+              <a:lumOff val="40000"/>
+            </a:schemeClr>
+          </a:solidFill>
+          <a:ln w="38100">
+            <a:solidFill>
+              <a:schemeClr val="tx2"/>
+            </a:solidFill>
+          </a:ln>
+        </p:spPr>
+        <p:style>
+          <a:lnRef idx="2">
+            <a:schemeClr val="accent2">
+              <a:shade val="15000"/>
+            </a:schemeClr>
+          </a:lnRef>
+          <a:fillRef idx="1">
+            <a:schemeClr val="accent2"/>
+          </a:fillRef>
+          <a:effectRef idx="0">
+            <a:schemeClr val="accent2"/>
+          </a:effectRef>
+          <a:fontRef idx="minor">
+            <a:schemeClr val="lt1"/>
+          </a:fontRef>
+        </p:style>
+        <p:txBody>
+          <a:bodyPr rtlCol="0" anchor="ctr"/>
+          <a:lstStyle/>
+          <a:p>
+            <a:pPr algn="ctr"/>
+            <a:r>
+              <a:rPr lang="en-US" sz="1600" b="1" dirty="0"/>
+              <a:t>OpenAI</a:t>
+            </a:r>
+            <a:r>
+              <a:rPr lang="en-US" sz="1600" dirty="0"/>
+              <a:t> </a:t>
+            </a:r>
+          </a:p>
+        </p:txBody>
+      </p:sp>
+      <p:sp>
+        <p:nvSpPr>
+          <p:cNvPr id="3" name="Speech Bubble: Rectangle with Corners Rounded 2">
+            <a:extLst>
+              <a:ext uri="{FF2B5EF4-FFF2-40B4-BE49-F238E27FC236}">
+                <a16:creationId xmlns:a16="http://schemas.microsoft.com/office/drawing/2014/main" id="{168AD1FF-FC7C-AB6F-4620-F9FB623681E1}"/>
+              </a:ext>
+            </a:extLst>
+          </p:cNvPr>
+          <p:cNvSpPr/>
+          <p:nvPr/>
+        </p:nvSpPr>
+        <p:spPr>
+          <a:xfrm>
+            <a:off x="2308821" y="1687492"/>
+            <a:ext cx="1409564" cy="385437"/>
+          </a:xfrm>
+          <a:prstGeom prst="wedgeRoundRectCallout">
+            <a:avLst>
+              <a:gd name="adj1" fmla="val -20833"/>
+              <a:gd name="adj2" fmla="val 92299"/>
+              <a:gd name="adj3" fmla="val 16667"/>
+            </a:avLst>
+          </a:prstGeom>
+        </p:spPr>
+        <p:style>
+          <a:lnRef idx="2">
+            <a:schemeClr val="accent4">
+              <a:shade val="15000"/>
+            </a:schemeClr>
+          </a:lnRef>
+          <a:fillRef idx="1">
+            <a:schemeClr val="accent4"/>
+          </a:fillRef>
+          <a:effectRef idx="0">
+            <a:schemeClr val="accent4"/>
+          </a:effectRef>
+          <a:fontRef idx="minor">
+            <a:schemeClr val="lt1"/>
+          </a:fontRef>
+        </p:style>
+        <p:txBody>
+          <a:bodyPr rtlCol="0" anchor="ctr"/>
+          <a:lstStyle/>
+          <a:p>
+            <a:pPr algn="ctr"/>
+            <a:r>
+              <a:rPr lang="en-US" sz="800" dirty="0"/>
+              <a:t>Cross Platform Client Android pixel</a:t>
+            </a:r>
+          </a:p>
+        </p:txBody>
+      </p:sp>
+      <p:sp>
+        <p:nvSpPr>
+          <p:cNvPr id="11" name="Speech Bubble: Rectangle with Corners Rounded 10">
+            <a:extLst>
+              <a:ext uri="{FF2B5EF4-FFF2-40B4-BE49-F238E27FC236}">
+                <a16:creationId xmlns:a16="http://schemas.microsoft.com/office/drawing/2014/main" id="{76EC2D1B-64F5-3316-EBFB-242AD9AFE6C2}"/>
+              </a:ext>
+            </a:extLst>
+          </p:cNvPr>
+          <p:cNvSpPr/>
+          <p:nvPr/>
+        </p:nvSpPr>
+        <p:spPr>
+          <a:xfrm>
+            <a:off x="2030624" y="3446952"/>
+            <a:ext cx="1695805" cy="560787"/>
+          </a:xfrm>
+          <a:prstGeom prst="wedgeRoundRectCallout">
+            <a:avLst>
+              <a:gd name="adj1" fmla="val -20833"/>
+              <a:gd name="adj2" fmla="val 92299"/>
+              <a:gd name="adj3" fmla="val 16667"/>
+            </a:avLst>
+          </a:prstGeom>
+          <a:solidFill>
+            <a:schemeClr val="bg1">
+              <a:lumMod val="75000"/>
+            </a:schemeClr>
+          </a:solidFill>
+        </p:spPr>
+        <p:style>
+          <a:lnRef idx="2">
+            <a:schemeClr val="accent4">
+              <a:shade val="15000"/>
+            </a:schemeClr>
+          </a:lnRef>
+          <a:fillRef idx="1">
+            <a:schemeClr val="accent4"/>
+          </a:fillRef>
+          <a:effectRef idx="0">
+            <a:schemeClr val="accent4"/>
+          </a:effectRef>
+          <a:fontRef idx="minor">
+            <a:schemeClr val="lt1"/>
+          </a:fontRef>
+        </p:style>
+        <p:txBody>
+          <a:bodyPr rtlCol="0" anchor="ctr"/>
+          <a:lstStyle/>
+          <a:p>
+            <a:pPr algn="ctr"/>
+            <a:r>
+              <a:rPr lang="en-US" sz="1050" dirty="0"/>
+              <a:t>Just</a:t>
+            </a:r>
+            <a:r>
+              <a:rPr lang="en-US" sz="1000" dirty="0"/>
+              <a:t> a visual helper to show the state </a:t>
+            </a:r>
+            <a:br>
+              <a:rPr lang="en-US" sz="1000" dirty="0"/>
+            </a:br>
+            <a:r>
+              <a:rPr lang="en-US" sz="1000" dirty="0"/>
+              <a:t>WPF APP</a:t>
+            </a:r>
+          </a:p>
+        </p:txBody>
+      </p:sp>
+      <p:sp>
+        <p:nvSpPr>
+          <p:cNvPr id="22" name="Flowchart: Connector 21">
+            <a:extLst>
+              <a:ext uri="{FF2B5EF4-FFF2-40B4-BE49-F238E27FC236}">
+                <a16:creationId xmlns:a16="http://schemas.microsoft.com/office/drawing/2014/main" id="{D31D4129-919F-78BF-21D4-FC1F2D8A75EA}"/>
+              </a:ext>
+            </a:extLst>
+          </p:cNvPr>
+          <p:cNvSpPr/>
+          <p:nvPr/>
+        </p:nvSpPr>
+        <p:spPr>
+          <a:xfrm>
+            <a:off x="1694267" y="2741396"/>
+            <a:ext cx="438442" cy="457946"/>
+          </a:xfrm>
+          <a:prstGeom prst="flowChartConnector">
+            <a:avLst/>
+          </a:prstGeom>
+          <a:solidFill>
+            <a:schemeClr val="accent6">
+              <a:lumMod val="60000"/>
+              <a:lumOff val="40000"/>
+            </a:schemeClr>
+          </a:solidFill>
+        </p:spPr>
+        <p:style>
+          <a:lnRef idx="2">
+            <a:schemeClr val="accent2">
+              <a:shade val="15000"/>
+            </a:schemeClr>
+          </a:lnRef>
+          <a:fillRef idx="1">
+            <a:schemeClr val="accent2"/>
+          </a:fillRef>
+          <a:effectRef idx="0">
+            <a:schemeClr val="accent2"/>
+          </a:effectRef>
+          <a:fontRef idx="minor">
+            <a:schemeClr val="lt1"/>
+          </a:fontRef>
+        </p:style>
+        <p:txBody>
+          <a:bodyPr rtlCol="0" anchor="ctr"/>
+          <a:lstStyle/>
+          <a:p>
+            <a:pPr algn="ctr"/>
+            <a:endParaRPr lang="en-US" sz="300" dirty="0"/>
+          </a:p>
+        </p:txBody>
+      </p:sp>
+      <p:sp>
+        <p:nvSpPr>
+          <p:cNvPr id="29" name="Speech Bubble: Rectangle with Corners Rounded 28">
+            <a:extLst>
+              <a:ext uri="{FF2B5EF4-FFF2-40B4-BE49-F238E27FC236}">
+                <a16:creationId xmlns:a16="http://schemas.microsoft.com/office/drawing/2014/main" id="{948F442B-8006-D3C5-DA81-45B4DFC3E4AA}"/>
+              </a:ext>
+            </a:extLst>
+          </p:cNvPr>
+          <p:cNvSpPr/>
+          <p:nvPr/>
+        </p:nvSpPr>
+        <p:spPr>
+          <a:xfrm>
+            <a:off x="363339" y="2584932"/>
+            <a:ext cx="994050" cy="673449"/>
+          </a:xfrm>
+          <a:prstGeom prst="wedgeRoundRectCallout">
+            <a:avLst>
+              <a:gd name="adj1" fmla="val 93264"/>
+              <a:gd name="adj2" fmla="val 14374"/>
+              <a:gd name="adj3" fmla="val 16667"/>
+            </a:avLst>
+          </a:prstGeom>
+          <a:solidFill>
+            <a:srgbClr val="92D050"/>
+          </a:solidFill>
+        </p:spPr>
+        <p:style>
+          <a:lnRef idx="2">
+            <a:schemeClr val="accent4">
+              <a:shade val="15000"/>
+            </a:schemeClr>
+          </a:lnRef>
+          <a:fillRef idx="1">
+            <a:schemeClr val="accent4"/>
+          </a:fillRef>
+          <a:effectRef idx="0">
+            <a:schemeClr val="accent4"/>
+          </a:effectRef>
+          <a:fontRef idx="minor">
+            <a:schemeClr val="lt1"/>
+          </a:fontRef>
+        </p:style>
+        <p:txBody>
+          <a:bodyPr rtlCol="0" anchor="ctr"/>
+          <a:lstStyle/>
+          <a:p>
+            <a:pPr algn="ctr"/>
+            <a:r>
+              <a:rPr lang="en-US" sz="1100" dirty="0"/>
+              <a:t>Connector to OpenAI</a:t>
+            </a:r>
+            <a:endParaRPr lang="en-US" sz="800" dirty="0"/>
+          </a:p>
+        </p:txBody>
+      </p:sp>
+    </p:spTree>
+    <p:extLst>
+      <p:ext uri="{BB962C8B-B14F-4D97-AF65-F5344CB8AC3E}">
+        <p14:creationId xmlns:p14="http://schemas.microsoft.com/office/powerpoint/2010/main" val="2821312262"/>
+      </p:ext>
+    </p:extLst>
+  </p:cSld>
+  <p:clrMapOvr>
+    <a:masterClrMapping/>
+  </p:clrMapOvr>
+</p:sld>
+</file>
+
+<file path=ppt/slides/slide2.xml><?xml version="1.0" encoding="utf-8"?>
+<p:sld xmlns:a="http://schemas.openxmlformats.org/drawingml/2006/main" xmlns:r="http://schemas.openxmlformats.org/officeDocument/2006/relationships" xmlns:p="http://schemas.openxmlformats.org/presentationml/2006/main">
+  <p:cSld>
+    <p:spTree>
+      <p:nvGrpSpPr>
+        <p:cNvPr id="1" name="">
+          <a:extLst>
+            <a:ext uri="{FF2B5EF4-FFF2-40B4-BE49-F238E27FC236}">
+              <a16:creationId xmlns:a16="http://schemas.microsoft.com/office/drawing/2014/main" id="{24E3B207-7093-925D-C21C-F48369AAF09A}"/>
+            </a:ext>
+          </a:extLst>
+        </p:cNvPr>
+        <p:cNvGrpSpPr/>
+        <p:nvPr/>
+      </p:nvGrpSpPr>
+      <p:grpSpPr>
+        <a:xfrm>
+          <a:off x="0" y="0"/>
+          <a:ext cx="0" cy="0"/>
+          <a:chOff x="0" y="0"/>
+          <a:chExt cx="0" cy="0"/>
+        </a:xfrm>
+      </p:grpSpPr>
+      <p:sp>
+        <p:nvSpPr>
+          <p:cNvPr id="8" name="Flowchart: Connector 7">
+            <a:extLst>
+              <a:ext uri="{FF2B5EF4-FFF2-40B4-BE49-F238E27FC236}">
+                <a16:creationId xmlns:a16="http://schemas.microsoft.com/office/drawing/2014/main" id="{9F4093E2-21A9-1365-0E7B-321ADFCEC12F}"/>
+              </a:ext>
+            </a:extLst>
+          </p:cNvPr>
+          <p:cNvSpPr/>
+          <p:nvPr/>
+        </p:nvSpPr>
+        <p:spPr>
+          <a:xfrm>
+            <a:off x="2280386" y="2123975"/>
+            <a:ext cx="1196282" cy="1134406"/>
+          </a:xfrm>
+          <a:prstGeom prst="flowChartConnector">
+            <a:avLst/>
+          </a:prstGeom>
+        </p:spPr>
+        <p:style>
+          <a:lnRef idx="2">
+            <a:schemeClr val="accent4">
+              <a:shade val="15000"/>
+            </a:schemeClr>
+          </a:lnRef>
+          <a:fillRef idx="1">
+            <a:schemeClr val="accent4"/>
+          </a:fillRef>
+          <a:effectRef idx="0">
+            <a:schemeClr val="accent4"/>
+          </a:effectRef>
+          <a:fontRef idx="minor">
+            <a:schemeClr val="lt1"/>
+          </a:fontRef>
+        </p:style>
+        <p:txBody>
+          <a:bodyPr rtlCol="0" anchor="ctr"/>
+          <a:lstStyle/>
+          <a:p>
+            <a:pPr algn="ctr"/>
+            <a:r>
+              <a:rPr lang="en-US" dirty="0"/>
+              <a:t>Smart Client</a:t>
+            </a:r>
+          </a:p>
+        </p:txBody>
+      </p:sp>
+      <p:sp>
+        <p:nvSpPr>
+          <p:cNvPr id="5" name="Oval 4">
+            <a:extLst>
+              <a:ext uri="{FF2B5EF4-FFF2-40B4-BE49-F238E27FC236}">
+                <a16:creationId xmlns:a16="http://schemas.microsoft.com/office/drawing/2014/main" id="{F605F3C4-5362-E307-81FE-C2635FC1F4AD}"/>
+              </a:ext>
+            </a:extLst>
+          </p:cNvPr>
+          <p:cNvSpPr/>
+          <p:nvPr/>
+        </p:nvSpPr>
+        <p:spPr>
+          <a:xfrm>
+            <a:off x="2280386" y="3956632"/>
+            <a:ext cx="1223784" cy="1134406"/>
+          </a:xfrm>
+          <a:prstGeom prst="ellipse">
+            <a:avLst/>
+          </a:prstGeom>
+          <a:solidFill>
+            <a:schemeClr val="bg1">
+              <a:lumMod val="75000"/>
+            </a:schemeClr>
+          </a:solidFill>
+        </p:spPr>
+        <p:style>
+          <a:lnRef idx="2">
+            <a:schemeClr val="accent4">
+              <a:shade val="15000"/>
+            </a:schemeClr>
+          </a:lnRef>
+          <a:fillRef idx="1">
+            <a:schemeClr val="accent4"/>
+          </a:fillRef>
+          <a:effectRef idx="0">
+            <a:schemeClr val="accent4"/>
+          </a:effectRef>
+          <a:fontRef idx="minor">
+            <a:schemeClr val="lt1"/>
+          </a:fontRef>
+        </p:style>
+        <p:txBody>
+          <a:bodyPr rtlCol="0" anchor="ctr"/>
+          <a:lstStyle/>
+          <a:p>
+            <a:pPr algn="ctr"/>
+            <a:r>
+              <a:rPr lang="en-US" dirty="0"/>
+              <a:t>Visual Client</a:t>
+            </a:r>
+          </a:p>
+        </p:txBody>
+      </p:sp>
+      <p:sp>
+        <p:nvSpPr>
+          <p:cNvPr id="6" name="Flowchart: Connector 5">
+            <a:extLst>
+              <a:ext uri="{FF2B5EF4-FFF2-40B4-BE49-F238E27FC236}">
+                <a16:creationId xmlns:a16="http://schemas.microsoft.com/office/drawing/2014/main" id="{CB9A5E7E-EF87-3E6D-F9E8-A5BA762179F0}"/>
+              </a:ext>
+            </a:extLst>
+          </p:cNvPr>
+          <p:cNvSpPr/>
+          <p:nvPr/>
+        </p:nvSpPr>
+        <p:spPr>
+          <a:xfrm>
+            <a:off x="3256089" y="2278666"/>
+            <a:ext cx="773459" cy="825023"/>
+          </a:xfrm>
+          <a:prstGeom prst="flowChartConnector">
+            <a:avLst/>
+          </a:prstGeom>
+        </p:spPr>
+        <p:style>
+          <a:lnRef idx="2">
+            <a:schemeClr val="accent1">
+              <a:shade val="15000"/>
+            </a:schemeClr>
+          </a:lnRef>
+          <a:fillRef idx="1">
+            <a:schemeClr val="accent1"/>
+          </a:fillRef>
+          <a:effectRef idx="0">
+            <a:schemeClr val="accent1"/>
+          </a:effectRef>
+          <a:fontRef idx="minor">
+            <a:schemeClr val="lt1"/>
+          </a:fontRef>
+        </p:style>
+        <p:txBody>
+          <a:bodyPr rtlCol="0" anchor="ctr"/>
+          <a:lstStyle/>
+          <a:p>
+            <a:pPr algn="ctr"/>
+            <a:r>
+              <a:rPr lang="en-US" sz="1050" dirty="0"/>
+              <a:t>Plugin</a:t>
+            </a:r>
+          </a:p>
+        </p:txBody>
+      </p:sp>
+      <p:sp>
+        <p:nvSpPr>
+          <p:cNvPr id="7" name="Flowchart: Connector 6">
+            <a:extLst>
+              <a:ext uri="{FF2B5EF4-FFF2-40B4-BE49-F238E27FC236}">
+                <a16:creationId xmlns:a16="http://schemas.microsoft.com/office/drawing/2014/main" id="{48257FDB-FE4D-15B1-1B2E-9707CFD8D208}"/>
+              </a:ext>
+            </a:extLst>
+          </p:cNvPr>
+          <p:cNvSpPr/>
+          <p:nvPr/>
+        </p:nvSpPr>
+        <p:spPr>
+          <a:xfrm>
+            <a:off x="1461448" y="1981012"/>
+            <a:ext cx="873171" cy="870360"/>
+          </a:xfrm>
+          <a:prstGeom prst="flowChartConnector">
+            <a:avLst/>
+          </a:prstGeom>
+        </p:spPr>
+        <p:style>
+          <a:lnRef idx="2">
+            <a:schemeClr val="accent6">
+              <a:shade val="15000"/>
+            </a:schemeClr>
+          </a:lnRef>
+          <a:fillRef idx="1">
+            <a:schemeClr val="accent6"/>
+          </a:fillRef>
+          <a:effectRef idx="0">
+            <a:schemeClr val="accent6"/>
+          </a:effectRef>
+          <a:fontRef idx="minor">
+            <a:schemeClr val="lt1"/>
+          </a:fontRef>
+        </p:style>
+        <p:txBody>
+          <a:bodyPr rtlCol="0" anchor="ctr"/>
+          <a:lstStyle/>
+          <a:p>
+            <a:pPr algn="ctr"/>
+            <a:r>
+              <a:rPr lang="en-US" sz="800" dirty="0"/>
+              <a:t>Azure Semantic Kernel</a:t>
+            </a:r>
+          </a:p>
+        </p:txBody>
+      </p:sp>
+      <p:sp>
+        <p:nvSpPr>
+          <p:cNvPr id="9" name="Flowchart: Connector 8">
+            <a:extLst>
+              <a:ext uri="{FF2B5EF4-FFF2-40B4-BE49-F238E27FC236}">
+                <a16:creationId xmlns:a16="http://schemas.microsoft.com/office/drawing/2014/main" id="{74591A83-D20B-5BC3-D8FC-73449DC89F6C}"/>
+              </a:ext>
+            </a:extLst>
+          </p:cNvPr>
+          <p:cNvSpPr/>
+          <p:nvPr/>
+        </p:nvSpPr>
+        <p:spPr>
+          <a:xfrm>
+            <a:off x="5833712" y="3389429"/>
+            <a:ext cx="1196282" cy="1134406"/>
+          </a:xfrm>
+          <a:prstGeom prst="flowChartConnector">
+            <a:avLst/>
+          </a:prstGeom>
+          <a:solidFill>
+            <a:schemeClr val="accent6">
+              <a:lumMod val="60000"/>
+              <a:lumOff val="40000"/>
+            </a:schemeClr>
+          </a:solidFill>
+        </p:spPr>
+        <p:style>
+          <a:lnRef idx="2">
+            <a:schemeClr val="accent2">
+              <a:shade val="15000"/>
+            </a:schemeClr>
+          </a:lnRef>
+          <a:fillRef idx="1">
+            <a:schemeClr val="accent2"/>
+          </a:fillRef>
+          <a:effectRef idx="0">
+            <a:schemeClr val="accent2"/>
+          </a:effectRef>
+          <a:fontRef idx="minor">
+            <a:schemeClr val="lt1"/>
+          </a:fontRef>
+        </p:style>
+        <p:txBody>
+          <a:bodyPr rtlCol="0" anchor="ctr"/>
+          <a:lstStyle/>
+          <a:p>
+            <a:pPr algn="ctr"/>
+            <a:r>
+              <a:rPr lang="en-US" sz="1600" dirty="0"/>
+              <a:t>LLM </a:t>
+            </a:r>
+          </a:p>
+        </p:txBody>
+      </p:sp>
+      <p:sp>
+        <p:nvSpPr>
+          <p:cNvPr id="4" name="Flowchart: Connector 3">
+            <a:extLst>
+              <a:ext uri="{FF2B5EF4-FFF2-40B4-BE49-F238E27FC236}">
+                <a16:creationId xmlns:a16="http://schemas.microsoft.com/office/drawing/2014/main" id="{03D46C8D-0E1F-23D0-7147-E4D072461E89}"/>
+              </a:ext>
+            </a:extLst>
+          </p:cNvPr>
+          <p:cNvSpPr/>
+          <p:nvPr/>
+        </p:nvSpPr>
+        <p:spPr>
+          <a:xfrm>
+            <a:off x="4029548" y="4807056"/>
+            <a:ext cx="1196282" cy="1134406"/>
+          </a:xfrm>
+          <a:prstGeom prst="flowChartConnector">
+            <a:avLst/>
+          </a:prstGeom>
+        </p:spPr>
+        <p:style>
+          <a:lnRef idx="2">
+            <a:schemeClr val="accent2">
+              <a:shade val="15000"/>
+            </a:schemeClr>
+          </a:lnRef>
+          <a:fillRef idx="1">
+            <a:schemeClr val="accent2"/>
+          </a:fillRef>
+          <a:effectRef idx="0">
+            <a:schemeClr val="accent2"/>
+          </a:effectRef>
+          <a:fontRef idx="minor">
+            <a:schemeClr val="lt1"/>
+          </a:fontRef>
+        </p:style>
+        <p:txBody>
+          <a:bodyPr rtlCol="0" anchor="ctr"/>
+          <a:lstStyle/>
+          <a:p>
+            <a:pPr algn="ctr"/>
+            <a:r>
+              <a:rPr lang="en-US" sz="1600" dirty="0"/>
+              <a:t>Service </a:t>
+            </a:r>
+          </a:p>
+        </p:txBody>
+      </p:sp>
+      <p:sp>
+        <p:nvSpPr>
+          <p:cNvPr id="10" name="Flowchart: Connector 9">
+            <a:extLst>
+              <a:ext uri="{FF2B5EF4-FFF2-40B4-BE49-F238E27FC236}">
+                <a16:creationId xmlns:a16="http://schemas.microsoft.com/office/drawing/2014/main" id="{E07C79F2-AF08-D635-451D-E72DE9DDA563}"/>
+              </a:ext>
+            </a:extLst>
+          </p:cNvPr>
+          <p:cNvSpPr/>
+          <p:nvPr/>
+        </p:nvSpPr>
+        <p:spPr>
+          <a:xfrm>
+            <a:off x="4493622" y="4342982"/>
+            <a:ext cx="268133" cy="288757"/>
+          </a:xfrm>
+          <a:prstGeom prst="flowChartConnector">
+            <a:avLst/>
+          </a:prstGeom>
+          <a:solidFill>
+            <a:schemeClr val="accent2"/>
+          </a:solidFill>
+        </p:spPr>
+        <p:style>
+          <a:lnRef idx="2">
+            <a:schemeClr val="accent1">
+              <a:shade val="15000"/>
+            </a:schemeClr>
+          </a:lnRef>
+          <a:fillRef idx="1">
+            <a:schemeClr val="accent1"/>
+          </a:fillRef>
+          <a:effectRef idx="0">
+            <a:schemeClr val="accent1"/>
+          </a:effectRef>
+          <a:fontRef idx="minor">
+            <a:schemeClr val="lt1"/>
+          </a:fontRef>
+        </p:style>
+        <p:txBody>
+          <a:bodyPr rtlCol="0" anchor="ctr"/>
+          <a:lstStyle/>
+          <a:p>
+            <a:pPr algn="ctr"/>
+            <a:endParaRPr lang="en-US"/>
+          </a:p>
+        </p:txBody>
+      </p:sp>
+      <p:cxnSp>
+        <p:nvCxnSpPr>
+          <p:cNvPr id="12" name="Straight Connector 11">
+            <a:extLst>
+              <a:ext uri="{FF2B5EF4-FFF2-40B4-BE49-F238E27FC236}">
+                <a16:creationId xmlns:a16="http://schemas.microsoft.com/office/drawing/2014/main" id="{B2C29B9E-CE82-36DA-640D-C851C5190368}"/>
+              </a:ext>
+            </a:extLst>
+          </p:cNvPr>
+          <p:cNvCxnSpPr>
+            <a:cxnSpLocks/>
+            <a:endCxn id="4" idx="0"/>
+          </p:cNvCxnSpPr>
+          <p:nvPr/>
+        </p:nvCxnSpPr>
+        <p:spPr>
+          <a:xfrm>
+            <a:off x="4627688" y="4631739"/>
+            <a:ext cx="1" cy="175317"/>
+          </a:xfrm>
+          <a:prstGeom prst="line">
+            <a:avLst/>
+          </a:prstGeom>
+        </p:spPr>
+        <p:style>
+          <a:lnRef idx="2">
+            <a:schemeClr val="accent1"/>
+          </a:lnRef>
+          <a:fillRef idx="0">
+            <a:schemeClr val="accent1"/>
+          </a:fillRef>
+          <a:effectRef idx="1">
+            <a:schemeClr val="accent1"/>
+          </a:effectRef>
+          <a:fontRef idx="minor">
+            <a:schemeClr val="tx1"/>
+          </a:fontRef>
+        </p:style>
+      </p:cxnSp>
+      <p:cxnSp>
+        <p:nvCxnSpPr>
+          <p:cNvPr id="16" name="Straight Arrow Connector 15">
+            <a:extLst>
+              <a:ext uri="{FF2B5EF4-FFF2-40B4-BE49-F238E27FC236}">
+                <a16:creationId xmlns:a16="http://schemas.microsoft.com/office/drawing/2014/main" id="{93F3D89E-6665-371B-AFC3-C419C902B097}"/>
+              </a:ext>
+            </a:extLst>
+          </p:cNvPr>
+          <p:cNvCxnSpPr>
+            <a:cxnSpLocks/>
+            <a:stCxn id="10" idx="2"/>
+            <a:endCxn id="5" idx="6"/>
+          </p:cNvCxnSpPr>
+          <p:nvPr/>
+        </p:nvCxnSpPr>
+        <p:spPr>
+          <a:xfrm flipH="1">
+            <a:off x="3504170" y="4487361"/>
+            <a:ext cx="989452" cy="36474"/>
+          </a:xfrm>
+          <a:prstGeom prst="straightConnector1">
+            <a:avLst/>
+          </a:prstGeom>
+          <a:ln>
             <a:tailEnd type="triangle"/>
           </a:ln>
         </p:spPr>
@@ -3811,7 +4961,7 @@
           <p:cNvPr id="20" name="Straight Arrow Connector 19">
             <a:extLst>
               <a:ext uri="{FF2B5EF4-FFF2-40B4-BE49-F238E27FC236}">
-                <a16:creationId xmlns:a16="http://schemas.microsoft.com/office/drawing/2014/main" id="{802C092D-AEDB-A5FC-8F11-A463874C936A}"/>
+                <a16:creationId xmlns:a16="http://schemas.microsoft.com/office/drawing/2014/main" id="{80153AF4-0E9B-8017-4800-C7EA68809C7C}"/>
               </a:ext>
             </a:extLst>
           </p:cNvPr>
@@ -3855,7 +5005,7 @@
           <p:cNvPr id="24" name="Flowchart: Connector 23">
             <a:extLst>
               <a:ext uri="{FF2B5EF4-FFF2-40B4-BE49-F238E27FC236}">
-                <a16:creationId xmlns:a16="http://schemas.microsoft.com/office/drawing/2014/main" id="{7C2147B3-E070-B0E7-0702-6F1507F0D7EC}"/>
+                <a16:creationId xmlns:a16="http://schemas.microsoft.com/office/drawing/2014/main" id="{3216CEC4-48F6-5B45-068B-5BFB6085A355}"/>
               </a:ext>
             </a:extLst>
           </p:cNvPr>
@@ -3910,7 +5060,7 @@
           <p:cNvPr id="25" name="Flowchart: Connector 24">
             <a:extLst>
               <a:ext uri="{FF2B5EF4-FFF2-40B4-BE49-F238E27FC236}">
-                <a16:creationId xmlns:a16="http://schemas.microsoft.com/office/drawing/2014/main" id="{561D299E-4498-D11F-FCE8-2181549A5D4A}"/>
+                <a16:creationId xmlns:a16="http://schemas.microsoft.com/office/drawing/2014/main" id="{5BB95465-8470-E95F-E34B-B91CCEF9A678}"/>
               </a:ext>
             </a:extLst>
           </p:cNvPr>
@@ -3955,7 +5105,14 @@
             <a:pPr algn="ctr"/>
             <a:r>
               <a:rPr lang="en-US" sz="1600" dirty="0"/>
-              <a:t>LLM </a:t>
+              <a:t>Azure</a:t>
+            </a:r>
+          </a:p>
+          <a:p>
+            <a:pPr algn="ctr"/>
+            <a:r>
+              <a:rPr lang="en-US" sz="1600" dirty="0"/>
+              <a:t>Google… </a:t>
             </a:r>
           </a:p>
         </p:txBody>
@@ -3965,7 +5122,7 @@
           <p:cNvPr id="26" name="Title 25">
             <a:extLst>
               <a:ext uri="{FF2B5EF4-FFF2-40B4-BE49-F238E27FC236}">
-                <a16:creationId xmlns:a16="http://schemas.microsoft.com/office/drawing/2014/main" id="{37B2E8B5-2048-C69A-7E08-BABE8BCC8F84}"/>
+                <a16:creationId xmlns:a16="http://schemas.microsoft.com/office/drawing/2014/main" id="{E484449C-A9E6-CC85-FD4B-1E2511570664}"/>
               </a:ext>
             </a:extLst>
           </p:cNvPr>
@@ -3993,21 +5150,21 @@
           <p:cNvPr id="27" name="Straight Arrow Connector 26">
             <a:extLst>
               <a:ext uri="{FF2B5EF4-FFF2-40B4-BE49-F238E27FC236}">
-                <a16:creationId xmlns:a16="http://schemas.microsoft.com/office/drawing/2014/main" id="{BD1BA78F-8189-91BF-EC65-61D762BAD9A1}"/>
+                <a16:creationId xmlns:a16="http://schemas.microsoft.com/office/drawing/2014/main" id="{D9DD7F1D-EE41-ECC8-F7FE-EF57877C0666}"/>
               </a:ext>
             </a:extLst>
           </p:cNvPr>
           <p:cNvCxnSpPr>
             <a:cxnSpLocks/>
             <a:stCxn id="6" idx="6"/>
-            <a:endCxn id="9" idx="1"/>
+            <a:endCxn id="2" idx="2"/>
           </p:cNvCxnSpPr>
           <p:nvPr/>
         </p:nvCxnSpPr>
         <p:spPr>
           <a:xfrm>
             <a:off x="4029548" y="2691178"/>
-            <a:ext cx="1979355" cy="864381"/>
+            <a:ext cx="1849821" cy="211202"/>
           </a:xfrm>
           <a:prstGeom prst="straightConnector1">
             <a:avLst/>
@@ -4037,7 +5194,7 @@
           <p:cNvPr id="30" name="TextBox 29">
             <a:extLst>
               <a:ext uri="{FF2B5EF4-FFF2-40B4-BE49-F238E27FC236}">
-                <a16:creationId xmlns:a16="http://schemas.microsoft.com/office/drawing/2014/main" id="{D7280BAD-DE7F-9C53-0345-4B409203D7BD}"/>
+                <a16:creationId xmlns:a16="http://schemas.microsoft.com/office/drawing/2014/main" id="{516A2512-2BE1-EF3F-5BAE-B08DFE91ABEF}"/>
               </a:ext>
             </a:extLst>
           </p:cNvPr>
@@ -4075,7 +5232,7 @@
           <a:p>
             <a:r>
               <a:rPr lang="en-US" dirty="0"/>
-              <a:t>Chat GPT</a:t>
+              <a:t>	OpenAI Connector</a:t>
             </a:r>
           </a:p>
           <a:p>
@@ -4091,7 +5248,7 @@
           <p:cNvPr id="31" name="Flowchart: Connector 30">
             <a:extLst>
               <a:ext uri="{FF2B5EF4-FFF2-40B4-BE49-F238E27FC236}">
-                <a16:creationId xmlns:a16="http://schemas.microsoft.com/office/drawing/2014/main" id="{F01D0EA4-0051-399D-7E42-B7B4CD9CF432}"/>
+                <a16:creationId xmlns:a16="http://schemas.microsoft.com/office/drawing/2014/main" id="{52E26270-F948-E78A-1F19-DC144694870D}"/>
               </a:ext>
             </a:extLst>
           </p:cNvPr>
@@ -4143,7 +5300,7 @@
           <p:cNvPr id="32" name="Straight Arrow Connector 31">
             <a:extLst>
               <a:ext uri="{FF2B5EF4-FFF2-40B4-BE49-F238E27FC236}">
-                <a16:creationId xmlns:a16="http://schemas.microsoft.com/office/drawing/2014/main" id="{AE0D0D00-42C9-4955-16C2-F0FD724DE75B}"/>
+                <a16:creationId xmlns:a16="http://schemas.microsoft.com/office/drawing/2014/main" id="{14A565CD-98FA-5D87-662D-D686C9C887CA}"/>
               </a:ext>
             </a:extLst>
           </p:cNvPr>
@@ -4187,7 +5344,7 @@
           <p:cNvPr id="36" name="TextBox 35">
             <a:extLst>
               <a:ext uri="{FF2B5EF4-FFF2-40B4-BE49-F238E27FC236}">
-                <a16:creationId xmlns:a16="http://schemas.microsoft.com/office/drawing/2014/main" id="{B0F7B519-F416-399B-D122-16B1BBB59AE9}"/>
+                <a16:creationId xmlns:a16="http://schemas.microsoft.com/office/drawing/2014/main" id="{3C8971DD-497D-E3D4-619D-BC8A4F8C400E}"/>
               </a:ext>
             </a:extLst>
           </p:cNvPr>
@@ -4224,10 +5381,298 @@
           </a:p>
         </p:txBody>
       </p:sp>
+      <p:sp>
+        <p:nvSpPr>
+          <p:cNvPr id="2" name="Flowchart: Connector 1">
+            <a:extLst>
+              <a:ext uri="{FF2B5EF4-FFF2-40B4-BE49-F238E27FC236}">
+                <a16:creationId xmlns:a16="http://schemas.microsoft.com/office/drawing/2014/main" id="{23753229-0533-3884-D046-5E7BAD7D6C65}"/>
+              </a:ext>
+            </a:extLst>
+          </p:cNvPr>
+          <p:cNvSpPr/>
+          <p:nvPr/>
+        </p:nvSpPr>
+        <p:spPr>
+          <a:xfrm>
+            <a:off x="5879369" y="2323508"/>
+            <a:ext cx="1227934" cy="1157743"/>
+          </a:xfrm>
+          <a:prstGeom prst="flowChartConnector">
+            <a:avLst/>
+          </a:prstGeom>
+          <a:solidFill>
+            <a:schemeClr val="accent6">
+              <a:lumMod val="60000"/>
+              <a:lumOff val="40000"/>
+            </a:schemeClr>
+          </a:solidFill>
+          <a:ln w="38100">
+            <a:solidFill>
+              <a:schemeClr val="tx2"/>
+            </a:solidFill>
+          </a:ln>
+        </p:spPr>
+        <p:style>
+          <a:lnRef idx="2">
+            <a:schemeClr val="accent2">
+              <a:shade val="15000"/>
+            </a:schemeClr>
+          </a:lnRef>
+          <a:fillRef idx="1">
+            <a:schemeClr val="accent2"/>
+          </a:fillRef>
+          <a:effectRef idx="0">
+            <a:schemeClr val="accent2"/>
+          </a:effectRef>
+          <a:fontRef idx="minor">
+            <a:schemeClr val="lt1"/>
+          </a:fontRef>
+        </p:style>
+        <p:txBody>
+          <a:bodyPr rtlCol="0" anchor="ctr"/>
+          <a:lstStyle/>
+          <a:p>
+            <a:pPr algn="ctr"/>
+            <a:r>
+              <a:rPr lang="en-US" sz="1600" b="1" dirty="0"/>
+              <a:t>OpenAI</a:t>
+            </a:r>
+            <a:r>
+              <a:rPr lang="en-US" sz="1600" dirty="0"/>
+              <a:t> </a:t>
+            </a:r>
+          </a:p>
+        </p:txBody>
+      </p:sp>
+      <p:sp>
+        <p:nvSpPr>
+          <p:cNvPr id="3" name="Speech Bubble: Rectangle with Corners Rounded 2">
+            <a:extLst>
+              <a:ext uri="{FF2B5EF4-FFF2-40B4-BE49-F238E27FC236}">
+                <a16:creationId xmlns:a16="http://schemas.microsoft.com/office/drawing/2014/main" id="{D6A79BFA-C005-3CAF-F903-25B084EC96C8}"/>
+              </a:ext>
+            </a:extLst>
+          </p:cNvPr>
+          <p:cNvSpPr/>
+          <p:nvPr/>
+        </p:nvSpPr>
+        <p:spPr>
+          <a:xfrm>
+            <a:off x="2308821" y="1687492"/>
+            <a:ext cx="1409564" cy="385437"/>
+          </a:xfrm>
+          <a:prstGeom prst="wedgeRoundRectCallout">
+            <a:avLst>
+              <a:gd name="adj1" fmla="val -20833"/>
+              <a:gd name="adj2" fmla="val 92299"/>
+              <a:gd name="adj3" fmla="val 16667"/>
+            </a:avLst>
+          </a:prstGeom>
+        </p:spPr>
+        <p:style>
+          <a:lnRef idx="2">
+            <a:schemeClr val="accent4">
+              <a:shade val="15000"/>
+            </a:schemeClr>
+          </a:lnRef>
+          <a:fillRef idx="1">
+            <a:schemeClr val="accent4"/>
+          </a:fillRef>
+          <a:effectRef idx="0">
+            <a:schemeClr val="accent4"/>
+          </a:effectRef>
+          <a:fontRef idx="minor">
+            <a:schemeClr val="lt1"/>
+          </a:fontRef>
+        </p:style>
+        <p:txBody>
+          <a:bodyPr rtlCol="0" anchor="ctr"/>
+          <a:lstStyle/>
+          <a:p>
+            <a:pPr algn="ctr"/>
+            <a:r>
+              <a:rPr lang="en-US" sz="800" dirty="0"/>
+              <a:t>Cross Platform Client Android pixel</a:t>
+            </a:r>
+          </a:p>
+        </p:txBody>
+      </p:sp>
+      <p:sp>
+        <p:nvSpPr>
+          <p:cNvPr id="11" name="Speech Bubble: Rectangle with Corners Rounded 10">
+            <a:extLst>
+              <a:ext uri="{FF2B5EF4-FFF2-40B4-BE49-F238E27FC236}">
+                <a16:creationId xmlns:a16="http://schemas.microsoft.com/office/drawing/2014/main" id="{8DA7AD56-8BCA-1980-A778-25FB429B72F6}"/>
+              </a:ext>
+            </a:extLst>
+          </p:cNvPr>
+          <p:cNvSpPr/>
+          <p:nvPr/>
+        </p:nvSpPr>
+        <p:spPr>
+          <a:xfrm>
+            <a:off x="2104174" y="3451113"/>
+            <a:ext cx="1695805" cy="465910"/>
+          </a:xfrm>
+          <a:prstGeom prst="wedgeRoundRectCallout">
+            <a:avLst>
+              <a:gd name="adj1" fmla="val -20833"/>
+              <a:gd name="adj2" fmla="val 92299"/>
+              <a:gd name="adj3" fmla="val 16667"/>
+            </a:avLst>
+          </a:prstGeom>
+          <a:solidFill>
+            <a:schemeClr val="bg1">
+              <a:lumMod val="75000"/>
+            </a:schemeClr>
+          </a:solidFill>
+        </p:spPr>
+        <p:style>
+          <a:lnRef idx="2">
+            <a:schemeClr val="accent4">
+              <a:shade val="15000"/>
+            </a:schemeClr>
+          </a:lnRef>
+          <a:fillRef idx="1">
+            <a:schemeClr val="accent4"/>
+          </a:fillRef>
+          <a:effectRef idx="0">
+            <a:schemeClr val="accent4"/>
+          </a:effectRef>
+          <a:fontRef idx="minor">
+            <a:schemeClr val="lt1"/>
+          </a:fontRef>
+        </p:style>
+        <p:txBody>
+          <a:bodyPr rtlCol="0" anchor="ctr"/>
+          <a:lstStyle/>
+          <a:p>
+            <a:pPr algn="ctr"/>
+            <a:r>
+              <a:rPr lang="en-US" sz="1050" dirty="0"/>
+              <a:t>Just</a:t>
+            </a:r>
+            <a:r>
+              <a:rPr lang="en-US" sz="1000" dirty="0"/>
+              <a:t> a visual helper to show the state (WPF APP)</a:t>
+            </a:r>
+          </a:p>
+        </p:txBody>
+      </p:sp>
+      <p:sp>
+        <p:nvSpPr>
+          <p:cNvPr id="22" name="Flowchart: Connector 21">
+            <a:extLst>
+              <a:ext uri="{FF2B5EF4-FFF2-40B4-BE49-F238E27FC236}">
+                <a16:creationId xmlns:a16="http://schemas.microsoft.com/office/drawing/2014/main" id="{65FB8AE1-F7D3-AAAF-3718-D0AD33ACB743}"/>
+              </a:ext>
+            </a:extLst>
+          </p:cNvPr>
+          <p:cNvSpPr/>
+          <p:nvPr/>
+        </p:nvSpPr>
+        <p:spPr>
+          <a:xfrm>
+            <a:off x="1694267" y="2741396"/>
+            <a:ext cx="438442" cy="457946"/>
+          </a:xfrm>
+          <a:prstGeom prst="flowChartConnector">
+            <a:avLst/>
+          </a:prstGeom>
+          <a:solidFill>
+            <a:schemeClr val="accent6">
+              <a:lumMod val="60000"/>
+              <a:lumOff val="40000"/>
+            </a:schemeClr>
+          </a:solidFill>
+        </p:spPr>
+        <p:style>
+          <a:lnRef idx="2">
+            <a:schemeClr val="accent2">
+              <a:shade val="15000"/>
+            </a:schemeClr>
+          </a:lnRef>
+          <a:fillRef idx="1">
+            <a:schemeClr val="accent2"/>
+          </a:fillRef>
+          <a:effectRef idx="0">
+            <a:schemeClr val="accent2"/>
+          </a:effectRef>
+          <a:fontRef idx="minor">
+            <a:schemeClr val="lt1"/>
+          </a:fontRef>
+        </p:style>
+        <p:txBody>
+          <a:bodyPr rtlCol="0" anchor="ctr"/>
+          <a:lstStyle/>
+          <a:p>
+            <a:pPr algn="ctr"/>
+            <a:endParaRPr lang="en-US" sz="300" dirty="0"/>
+          </a:p>
+        </p:txBody>
+      </p:sp>
+      <p:sp>
+        <p:nvSpPr>
+          <p:cNvPr id="29" name="Speech Bubble: Rectangle with Corners Rounded 28">
+            <a:extLst>
+              <a:ext uri="{FF2B5EF4-FFF2-40B4-BE49-F238E27FC236}">
+                <a16:creationId xmlns:a16="http://schemas.microsoft.com/office/drawing/2014/main" id="{34423F78-8F85-9C6F-14F7-E867EDD6EFAB}"/>
+              </a:ext>
+            </a:extLst>
+          </p:cNvPr>
+          <p:cNvSpPr/>
+          <p:nvPr/>
+        </p:nvSpPr>
+        <p:spPr>
+          <a:xfrm>
+            <a:off x="363339" y="2584932"/>
+            <a:ext cx="994050" cy="673449"/>
+          </a:xfrm>
+          <a:prstGeom prst="wedgeRoundRectCallout">
+            <a:avLst>
+              <a:gd name="adj1" fmla="val 93264"/>
+              <a:gd name="adj2" fmla="val 14374"/>
+              <a:gd name="adj3" fmla="val 16667"/>
+            </a:avLst>
+          </a:prstGeom>
+          <a:solidFill>
+            <a:srgbClr val="92D050"/>
+          </a:solidFill>
+        </p:spPr>
+        <p:style>
+          <a:lnRef idx="2">
+            <a:schemeClr val="accent4">
+              <a:shade val="15000"/>
+            </a:schemeClr>
+          </a:lnRef>
+          <a:fillRef idx="1">
+            <a:schemeClr val="accent4"/>
+          </a:fillRef>
+          <a:effectRef idx="0">
+            <a:schemeClr val="accent4"/>
+          </a:effectRef>
+          <a:fontRef idx="minor">
+            <a:schemeClr val="lt1"/>
+          </a:fontRef>
+        </p:style>
+        <p:txBody>
+          <a:bodyPr rtlCol="0" anchor="ctr"/>
+          <a:lstStyle/>
+          <a:p>
+            <a:pPr algn="ctr"/>
+            <a:r>
+              <a:rPr lang="en-US" sz="1100" dirty="0"/>
+              <a:t>Connector to OpenAI</a:t>
+            </a:r>
+            <a:endParaRPr lang="en-US" sz="800" dirty="0"/>
+          </a:p>
+        </p:txBody>
+      </p:sp>
     </p:spTree>
     <p:extLst>
       <p:ext uri="{BB962C8B-B14F-4D97-AF65-F5344CB8AC3E}">
-        <p14:creationId xmlns:p14="http://schemas.microsoft.com/office/powerpoint/2010/main" val="2821312262"/>
+        <p14:creationId xmlns:p14="http://schemas.microsoft.com/office/powerpoint/2010/main" val="2323636389"/>
       </p:ext>
     </p:extLst>
   </p:cSld>
@@ -4237,7 +5682,7 @@
 </p:sld>
 </file>
 
-<file path=ppt/slides/slide2.xml><?xml version="1.0" encoding="utf-8"?>
+<file path=ppt/slides/slide3.xml><?xml version="1.0" encoding="utf-8"?>
 <p:sld xmlns:a="http://schemas.openxmlformats.org/drawingml/2006/main" xmlns:r="http://schemas.openxmlformats.org/officeDocument/2006/relationships" xmlns:p="http://schemas.openxmlformats.org/presentationml/2006/main">
   <p:cSld>
     <p:spTree>

</xml_diff>

<commit_message>
Refactor light-related identifiers for clarity
Renamed properties and parameters from `Id` to `LightId` across multiple classes, including `Light`, `LightUpdateRequest`, `UpdateLightResponse`, and `LightViewModel`, to enhance clarity and consistency. Removed the `ConsolePluginTester` project from the solution file (`AIKernelClient.sln`) and updated associated configurations. Improved API endpoint descriptions and adjusted comments to reflect the new naming conventions, aiming to enhance code readability and maintainability while preserving functionality.
</commit_message>
<xml_diff>
--- a/AI Friendly APIs.pptx
+++ b/AI Friendly APIs.pptx
@@ -205,7 +205,7 @@
           <a:p>
             <a:fld id="{67EC03D2-C5C5-4BDB-9C9E-43780E2A05CE}" type="datetimeFigureOut">
               <a:rPr lang="en-US" smtClean="0"/>
-              <a:t>2/16/2025</a:t>
+              <a:t>2/25/2025</a:t>
             </a:fld>
             <a:endParaRPr lang="en-US"/>
           </a:p>
@@ -825,7 +825,7 @@
           <a:p>
             <a:fld id="{9564C4B6-AF8B-47D1-A3BA-C9921D51DAF6}" type="datetimeFigureOut">
               <a:rPr lang="en-US" smtClean="0"/>
-              <a:t>2/16/2025</a:t>
+              <a:t>2/25/2025</a:t>
             </a:fld>
             <a:endParaRPr lang="en-US"/>
           </a:p>
@@ -1137,7 +1137,7 @@
           <a:p>
             <a:fld id="{9564C4B6-AF8B-47D1-A3BA-C9921D51DAF6}" type="datetimeFigureOut">
               <a:rPr lang="en-US" smtClean="0"/>
-              <a:t>2/16/2025</a:t>
+              <a:t>2/25/2025</a:t>
             </a:fld>
             <a:endParaRPr lang="en-US"/>
           </a:p>
@@ -1359,7 +1359,7 @@
           <a:p>
             <a:fld id="{9564C4B6-AF8B-47D1-A3BA-C9921D51DAF6}" type="datetimeFigureOut">
               <a:rPr lang="en-US" smtClean="0"/>
-              <a:t>2/16/2025</a:t>
+              <a:t>2/25/2025</a:t>
             </a:fld>
             <a:endParaRPr lang="en-US"/>
           </a:p>
@@ -1650,7 +1650,7 @@
           <a:p>
             <a:fld id="{9564C4B6-AF8B-47D1-A3BA-C9921D51DAF6}" type="datetimeFigureOut">
               <a:rPr lang="en-US" smtClean="0"/>
-              <a:t>2/16/2025</a:t>
+              <a:t>2/25/2025</a:t>
             </a:fld>
             <a:endParaRPr lang="en-US"/>
           </a:p>
@@ -2104,7 +2104,7 @@
           <a:p>
             <a:fld id="{9564C4B6-AF8B-47D1-A3BA-C9921D51DAF6}" type="datetimeFigureOut">
               <a:rPr lang="en-US" smtClean="0"/>
-              <a:t>2/16/2025</a:t>
+              <a:t>2/25/2025</a:t>
             </a:fld>
             <a:endParaRPr lang="en-US"/>
           </a:p>
@@ -2680,7 +2680,7 @@
           <a:p>
             <a:fld id="{9564C4B6-AF8B-47D1-A3BA-C9921D51DAF6}" type="datetimeFigureOut">
               <a:rPr lang="en-US" smtClean="0"/>
-              <a:t>2/16/2025</a:t>
+              <a:t>2/25/2025</a:t>
             </a:fld>
             <a:endParaRPr lang="en-US"/>
           </a:p>
@@ -3532,7 +3532,7 @@
           <a:p>
             <a:fld id="{9564C4B6-AF8B-47D1-A3BA-C9921D51DAF6}" type="datetimeFigureOut">
               <a:rPr lang="en-US" smtClean="0"/>
-              <a:t>2/16/2025</a:t>
+              <a:t>2/25/2025</a:t>
             </a:fld>
             <a:endParaRPr lang="en-US"/>
           </a:p>
@@ -3737,7 +3737,7 @@
           <a:p>
             <a:fld id="{9564C4B6-AF8B-47D1-A3BA-C9921D51DAF6}" type="datetimeFigureOut">
               <a:rPr lang="en-US" smtClean="0"/>
-              <a:t>2/16/2025</a:t>
+              <a:t>2/25/2025</a:t>
             </a:fld>
             <a:endParaRPr lang="en-US"/>
           </a:p>
@@ -3951,7 +3951,7 @@
           <a:p>
             <a:fld id="{9564C4B6-AF8B-47D1-A3BA-C9921D51DAF6}" type="datetimeFigureOut">
               <a:rPr lang="en-US" smtClean="0"/>
-              <a:t>2/16/2025</a:t>
+              <a:t>2/25/2025</a:t>
             </a:fld>
             <a:endParaRPr lang="en-US"/>
           </a:p>
@@ -4156,7 +4156,7 @@
           <a:p>
             <a:fld id="{9564C4B6-AF8B-47D1-A3BA-C9921D51DAF6}" type="datetimeFigureOut">
               <a:rPr lang="en-US" smtClean="0"/>
-              <a:t>2/16/2025</a:t>
+              <a:t>2/25/2025</a:t>
             </a:fld>
             <a:endParaRPr lang="en-US"/>
           </a:p>
@@ -4436,7 +4436,7 @@
           <a:p>
             <a:fld id="{9564C4B6-AF8B-47D1-A3BA-C9921D51DAF6}" type="datetimeFigureOut">
               <a:rPr lang="en-US" smtClean="0"/>
-              <a:t>2/16/2025</a:t>
+              <a:t>2/25/2025</a:t>
             </a:fld>
             <a:endParaRPr lang="en-US"/>
           </a:p>
@@ -4703,7 +4703,7 @@
           <a:p>
             <a:fld id="{9564C4B6-AF8B-47D1-A3BA-C9921D51DAF6}" type="datetimeFigureOut">
               <a:rPr lang="en-US" smtClean="0"/>
-              <a:t>2/16/2025</a:t>
+              <a:t>2/25/2025</a:t>
             </a:fld>
             <a:endParaRPr lang="en-US"/>
           </a:p>
@@ -5118,7 +5118,7 @@
           <a:p>
             <a:fld id="{9564C4B6-AF8B-47D1-A3BA-C9921D51DAF6}" type="datetimeFigureOut">
               <a:rPr lang="en-US" smtClean="0"/>
-              <a:t>2/16/2025</a:t>
+              <a:t>2/25/2025</a:t>
             </a:fld>
             <a:endParaRPr lang="en-US"/>
           </a:p>
@@ -5266,7 +5266,7 @@
           <a:p>
             <a:fld id="{9564C4B6-AF8B-47D1-A3BA-C9921D51DAF6}" type="datetimeFigureOut">
               <a:rPr lang="en-US" smtClean="0"/>
-              <a:t>2/16/2025</a:t>
+              <a:t>2/25/2025</a:t>
             </a:fld>
             <a:endParaRPr lang="en-US"/>
           </a:p>
@@ -5391,7 +5391,7 @@
           <a:p>
             <a:fld id="{9564C4B6-AF8B-47D1-A3BA-C9921D51DAF6}" type="datetimeFigureOut">
               <a:rPr lang="en-US" smtClean="0"/>
-              <a:t>2/16/2025</a:t>
+              <a:t>2/25/2025</a:t>
             </a:fld>
             <a:endParaRPr lang="en-US"/>
           </a:p>
@@ -5670,7 +5670,7 @@
           <a:p>
             <a:fld id="{9564C4B6-AF8B-47D1-A3BA-C9921D51DAF6}" type="datetimeFigureOut">
               <a:rPr lang="en-US" smtClean="0"/>
-              <a:t>2/16/2025</a:t>
+              <a:t>2/25/2025</a:t>
             </a:fld>
             <a:endParaRPr lang="en-US"/>
           </a:p>
@@ -5982,7 +5982,7 @@
           <a:p>
             <a:fld id="{9564C4B6-AF8B-47D1-A3BA-C9921D51DAF6}" type="datetimeFigureOut">
               <a:rPr lang="en-US" smtClean="0"/>
-              <a:t>2/16/2025</a:t>
+              <a:t>2/25/2025</a:t>
             </a:fld>
             <a:endParaRPr lang="en-US"/>
           </a:p>
@@ -6235,7 +6235,7 @@
           <a:p>
             <a:fld id="{9564C4B6-AF8B-47D1-A3BA-C9921D51DAF6}" type="datetimeFigureOut">
               <a:rPr lang="en-US" smtClean="0"/>
-              <a:t>2/16/2025</a:t>
+              <a:t>2/25/2025</a:t>
             </a:fld>
             <a:endParaRPr lang="en-US"/>
           </a:p>
@@ -7026,12 +7026,12 @@
         <p:spPr>
           <a:xfrm>
             <a:off x="4634794" y="1049695"/>
-            <a:ext cx="6642806" cy="4758611"/>
+            <a:ext cx="6642806" cy="5041389"/>
           </a:xfrm>
         </p:spPr>
         <p:txBody>
           <a:bodyPr anchor="ctr">
-            <a:normAutofit/>
+            <a:normAutofit lnSpcReduction="10000"/>
           </a:bodyPr>
           <a:lstStyle/>
           <a:p>
@@ -7071,6 +7071,27 @@
             <a:r>
               <a:rPr lang="en-US" dirty="0"/>
               <a:t>Improve precision and reduce cost</a:t>
+            </a:r>
+          </a:p>
+          <a:p>
+            <a:pPr lvl="1"/>
+            <a:r>
+              <a:rPr lang="en-US" dirty="0"/>
+              <a:t>I am not going to Cover GRPC because:</a:t>
+            </a:r>
+          </a:p>
+          <a:p>
+            <a:pPr lvl="2"/>
+            <a:r>
+              <a:rPr lang="en-US" dirty="0"/>
+              <a:t>I am not an expert, but I am learning</a:t>
+            </a:r>
+          </a:p>
+          <a:p>
+            <a:pPr lvl="2"/>
+            <a:r>
+              <a:rPr lang="en-US" dirty="0"/>
+              <a:t>GRPC is more suited to private API (e.g., communication across microservices)</a:t>
             </a:r>
           </a:p>
           <a:p>
@@ -7782,7 +7803,7 @@
           <a:p>
             <a:r>
               <a:rPr lang="en-US" dirty="0"/>
-              <a:t>The model only knows the </a:t>
+              <a:t>The AI model only knows the </a:t>
             </a:r>
             <a:r>
               <a:rPr lang="en-US" dirty="0" err="1"/>
@@ -7839,7 +7860,7 @@
             <a:pPr lvl="1"/>
             <a:r>
               <a:rPr lang="en-US" dirty="0"/>
-              <a:t>SK only manages the creation of a plugin out of the </a:t>
+              <a:t>SK manages the creation of a plugin out of the </a:t>
             </a:r>
             <a:r>
               <a:rPr lang="en-US" dirty="0" err="1"/>

</xml_diff>